<commit_message>
Added Roman Zavodskikh notes to class0{2,3,4,5}
</commit_message>
<xml_diff>
--- a/talks/src/class04.pptx
+++ b/talks/src/class04.pptx
@@ -6,10 +6,10 @@
     <p:sldMasterId id="2147483660" r:id="rId2"/>
   </p:sldMasterIdLst>
   <p:notesMasterIdLst>
-    <p:notesMasterId r:id="rId39"/>
+    <p:notesMasterId r:id="rId40"/>
   </p:notesMasterIdLst>
   <p:handoutMasterIdLst>
-    <p:handoutMasterId r:id="rId40"/>
+    <p:handoutMasterId r:id="rId41"/>
   </p:handoutMasterIdLst>
   <p:sldIdLst>
     <p:sldId id="280" r:id="rId3"/>
@@ -33,21 +33,22 @@
     <p:sldId id="314" r:id="rId21"/>
     <p:sldId id="331" r:id="rId22"/>
     <p:sldId id="332" r:id="rId23"/>
-    <p:sldId id="333" r:id="rId24"/>
-    <p:sldId id="334" r:id="rId25"/>
-    <p:sldId id="335" r:id="rId26"/>
-    <p:sldId id="313" r:id="rId27"/>
-    <p:sldId id="312" r:id="rId28"/>
-    <p:sldId id="338" r:id="rId29"/>
-    <p:sldId id="337" r:id="rId30"/>
-    <p:sldId id="348" r:id="rId31"/>
-    <p:sldId id="339" r:id="rId32"/>
-    <p:sldId id="342" r:id="rId33"/>
-    <p:sldId id="343" r:id="rId34"/>
-    <p:sldId id="340" r:id="rId35"/>
-    <p:sldId id="336" r:id="rId36"/>
-    <p:sldId id="345" r:id="rId37"/>
-    <p:sldId id="346" r:id="rId38"/>
+    <p:sldId id="349" r:id="rId24"/>
+    <p:sldId id="333" r:id="rId25"/>
+    <p:sldId id="334" r:id="rId26"/>
+    <p:sldId id="335" r:id="rId27"/>
+    <p:sldId id="313" r:id="rId28"/>
+    <p:sldId id="312" r:id="rId29"/>
+    <p:sldId id="338" r:id="rId30"/>
+    <p:sldId id="337" r:id="rId31"/>
+    <p:sldId id="348" r:id="rId32"/>
+    <p:sldId id="339" r:id="rId33"/>
+    <p:sldId id="342" r:id="rId34"/>
+    <p:sldId id="343" r:id="rId35"/>
+    <p:sldId id="340" r:id="rId36"/>
+    <p:sldId id="336" r:id="rId37"/>
+    <p:sldId id="345" r:id="rId38"/>
+    <p:sldId id="346" r:id="rId39"/>
   </p:sldIdLst>
   <p:sldSz cx="12192000" cy="6858000"/>
   <p:notesSz cx="6858000" cy="9144000"/>
@@ -239,7 +240,7 @@
           <a:p>
             <a:fld id="{56C6788E-680A-49E5-BB93-D456A9D23A29}" type="datetimeFigureOut">
               <a:rPr lang="ru-RU" smtClean="0"/>
-              <a:t>24.10.2018</a:t>
+              <a:t>30.09.2019</a:t>
             </a:fld>
             <a:endParaRPr lang="ru-RU"/>
           </a:p>
@@ -408,7 +409,7 @@
           <a:p>
             <a:fld id="{C4DF4945-C160-4CD5-B124-49B9BE14C0AB}" type="datetimeFigureOut">
               <a:rPr lang="ru-RU" smtClean="0"/>
-              <a:t>24.10.2018</a:t>
+              <a:t>30.09.2019</a:t>
             </a:fld>
             <a:endParaRPr lang="ru-RU"/>
           </a:p>
@@ -2257,7 +2258,7 @@
     </p:spTree>
     <p:extLst>
       <p:ext uri="{BB962C8B-B14F-4D97-AF65-F5344CB8AC3E}">
-        <p14:creationId xmlns:p14="http://schemas.microsoft.com/office/powerpoint/2010/main" val="933060383"/>
+        <p14:creationId xmlns:p14="http://schemas.microsoft.com/office/powerpoint/2010/main" val="346085281"/>
       </p:ext>
     </p:extLst>
   </p:cSld>
@@ -2363,7 +2364,7 @@
     </p:spTree>
     <p:extLst>
       <p:ext uri="{BB962C8B-B14F-4D97-AF65-F5344CB8AC3E}">
-        <p14:creationId xmlns:p14="http://schemas.microsoft.com/office/powerpoint/2010/main" val="3208473524"/>
+        <p14:creationId xmlns:p14="http://schemas.microsoft.com/office/powerpoint/2010/main" val="933060383"/>
       </p:ext>
     </p:extLst>
   </p:cSld>
@@ -2469,7 +2470,7 @@
     </p:spTree>
     <p:extLst>
       <p:ext uri="{BB962C8B-B14F-4D97-AF65-F5344CB8AC3E}">
-        <p14:creationId xmlns:p14="http://schemas.microsoft.com/office/powerpoint/2010/main" val="993095959"/>
+        <p14:creationId xmlns:p14="http://schemas.microsoft.com/office/powerpoint/2010/main" val="3208473524"/>
       </p:ext>
     </p:extLst>
   </p:cSld>
@@ -2575,7 +2576,7 @@
     </p:spTree>
     <p:extLst>
       <p:ext uri="{BB962C8B-B14F-4D97-AF65-F5344CB8AC3E}">
-        <p14:creationId xmlns:p14="http://schemas.microsoft.com/office/powerpoint/2010/main" val="14134280"/>
+        <p14:creationId xmlns:p14="http://schemas.microsoft.com/office/powerpoint/2010/main" val="993095959"/>
       </p:ext>
     </p:extLst>
   </p:cSld>
@@ -2681,7 +2682,7 @@
     </p:spTree>
     <p:extLst>
       <p:ext uri="{BB962C8B-B14F-4D97-AF65-F5344CB8AC3E}">
-        <p14:creationId xmlns:p14="http://schemas.microsoft.com/office/powerpoint/2010/main" val="1354074300"/>
+        <p14:creationId xmlns:p14="http://schemas.microsoft.com/office/powerpoint/2010/main" val="14134280"/>
       </p:ext>
     </p:extLst>
   </p:cSld>
@@ -2787,7 +2788,7 @@
     </p:spTree>
     <p:extLst>
       <p:ext uri="{BB962C8B-B14F-4D97-AF65-F5344CB8AC3E}">
-        <p14:creationId xmlns:p14="http://schemas.microsoft.com/office/powerpoint/2010/main" val="85712766"/>
+        <p14:creationId xmlns:p14="http://schemas.microsoft.com/office/powerpoint/2010/main" val="1354074300"/>
       </p:ext>
     </p:extLst>
   </p:cSld>
@@ -2893,7 +2894,7 @@
     </p:spTree>
     <p:extLst>
       <p:ext uri="{BB962C8B-B14F-4D97-AF65-F5344CB8AC3E}">
-        <p14:creationId xmlns:p14="http://schemas.microsoft.com/office/powerpoint/2010/main" val="723159199"/>
+        <p14:creationId xmlns:p14="http://schemas.microsoft.com/office/powerpoint/2010/main" val="85712766"/>
       </p:ext>
     </p:extLst>
   </p:cSld>
@@ -2999,7 +3000,7 @@
     </p:spTree>
     <p:extLst>
       <p:ext uri="{BB962C8B-B14F-4D97-AF65-F5344CB8AC3E}">
-        <p14:creationId xmlns:p14="http://schemas.microsoft.com/office/powerpoint/2010/main" val="208729644"/>
+        <p14:creationId xmlns:p14="http://schemas.microsoft.com/office/powerpoint/2010/main" val="723159199"/>
       </p:ext>
     </p:extLst>
   </p:cSld>
@@ -3211,7 +3212,7 @@
     </p:spTree>
     <p:extLst>
       <p:ext uri="{BB962C8B-B14F-4D97-AF65-F5344CB8AC3E}">
-        <p14:creationId xmlns:p14="http://schemas.microsoft.com/office/powerpoint/2010/main" val="2115686009"/>
+        <p14:creationId xmlns:p14="http://schemas.microsoft.com/office/powerpoint/2010/main" val="208729644"/>
       </p:ext>
     </p:extLst>
   </p:cSld>
@@ -3317,7 +3318,7 @@
     </p:spTree>
     <p:extLst>
       <p:ext uri="{BB962C8B-B14F-4D97-AF65-F5344CB8AC3E}">
-        <p14:creationId xmlns:p14="http://schemas.microsoft.com/office/powerpoint/2010/main" val="2640832111"/>
+        <p14:creationId xmlns:p14="http://schemas.microsoft.com/office/powerpoint/2010/main" val="2115686009"/>
       </p:ext>
     </p:extLst>
   </p:cSld>
@@ -3423,7 +3424,7 @@
     </p:spTree>
     <p:extLst>
       <p:ext uri="{BB962C8B-B14F-4D97-AF65-F5344CB8AC3E}">
-        <p14:creationId xmlns:p14="http://schemas.microsoft.com/office/powerpoint/2010/main" val="1510798347"/>
+        <p14:creationId xmlns:p14="http://schemas.microsoft.com/office/powerpoint/2010/main" val="2640832111"/>
       </p:ext>
     </p:extLst>
   </p:cSld>
@@ -3529,7 +3530,7 @@
     </p:spTree>
     <p:extLst>
       <p:ext uri="{BB962C8B-B14F-4D97-AF65-F5344CB8AC3E}">
-        <p14:creationId xmlns:p14="http://schemas.microsoft.com/office/powerpoint/2010/main" val="2144472225"/>
+        <p14:creationId xmlns:p14="http://schemas.microsoft.com/office/powerpoint/2010/main" val="1510798347"/>
       </p:ext>
     </p:extLst>
   </p:cSld>
@@ -3635,7 +3636,7 @@
     </p:spTree>
     <p:extLst>
       <p:ext uri="{BB962C8B-B14F-4D97-AF65-F5344CB8AC3E}">
-        <p14:creationId xmlns:p14="http://schemas.microsoft.com/office/powerpoint/2010/main" val="1768504824"/>
+        <p14:creationId xmlns:p14="http://schemas.microsoft.com/office/powerpoint/2010/main" val="2144472225"/>
       </p:ext>
     </p:extLst>
   </p:cSld>
@@ -3741,7 +3742,7 @@
     </p:spTree>
     <p:extLst>
       <p:ext uri="{BB962C8B-B14F-4D97-AF65-F5344CB8AC3E}">
-        <p14:creationId xmlns:p14="http://schemas.microsoft.com/office/powerpoint/2010/main" val="2354734903"/>
+        <p14:creationId xmlns:p14="http://schemas.microsoft.com/office/powerpoint/2010/main" val="1768504824"/>
       </p:ext>
     </p:extLst>
   </p:cSld>
@@ -3817,6 +3818,112 @@
             <a:fld id="{7F33120B-582B-4354-977D-A474A534F6B9}" type="slidenum">
               <a:rPr lang="ru-RU" smtClean="0"/>
               <a:t>36</a:t>
+            </a:fld>
+            <a:endParaRPr lang="ru-RU"/>
+          </a:p>
+        </p:txBody>
+      </p:sp>
+      <p:sp>
+        <p:nvSpPr>
+          <p:cNvPr id="5" name="Header Placeholder 4"/>
+          <p:cNvSpPr>
+            <a:spLocks noGrp="1"/>
+          </p:cNvSpPr>
+          <p:nvPr>
+            <p:ph type="hdr" sz="quarter" idx="11"/>
+          </p:nvPr>
+        </p:nvSpPr>
+        <p:spPr/>
+        <p:txBody>
+          <a:bodyPr/>
+          <a:lstStyle/>
+          <a:p>
+            <a:r>
+              <a:rPr lang="ru-RU"/>
+              <a:t>Основы построения файловых систем</a:t>
+            </a:r>
+          </a:p>
+        </p:txBody>
+      </p:sp>
+    </p:spTree>
+    <p:extLst>
+      <p:ext uri="{BB962C8B-B14F-4D97-AF65-F5344CB8AC3E}">
+        <p14:creationId xmlns:p14="http://schemas.microsoft.com/office/powerpoint/2010/main" val="2354734903"/>
+      </p:ext>
+    </p:extLst>
+  </p:cSld>
+  <p:clrMapOvr>
+    <a:masterClrMapping/>
+  </p:clrMapOvr>
+</p:notes>
+</file>
+
+<file path=ppt/notesSlides/notesSlide37.xml><?xml version="1.0" encoding="utf-8"?>
+<p:notes xmlns:a="http://schemas.openxmlformats.org/drawingml/2006/main" xmlns:r="http://schemas.openxmlformats.org/officeDocument/2006/relationships" xmlns:p="http://schemas.openxmlformats.org/presentationml/2006/main">
+  <p:cSld>
+    <p:spTree>
+      <p:nvGrpSpPr>
+        <p:cNvPr id="1" name=""/>
+        <p:cNvGrpSpPr/>
+        <p:nvPr/>
+      </p:nvGrpSpPr>
+      <p:grpSpPr>
+        <a:xfrm>
+          <a:off x="0" y="0"/>
+          <a:ext cx="0" cy="0"/>
+          <a:chOff x="0" y="0"/>
+          <a:chExt cx="0" cy="0"/>
+        </a:xfrm>
+      </p:grpSpPr>
+      <p:sp>
+        <p:nvSpPr>
+          <p:cNvPr id="2" name="Slide Image Placeholder 1"/>
+          <p:cNvSpPr>
+            <a:spLocks noGrp="1" noRot="1" noChangeAspect="1"/>
+          </p:cNvSpPr>
+          <p:nvPr>
+            <p:ph type="sldImg"/>
+          </p:nvPr>
+        </p:nvSpPr>
+        <p:spPr/>
+      </p:sp>
+      <p:sp>
+        <p:nvSpPr>
+          <p:cNvPr id="3" name="Notes Placeholder 2"/>
+          <p:cNvSpPr>
+            <a:spLocks noGrp="1"/>
+          </p:cNvSpPr>
+          <p:nvPr>
+            <p:ph type="body" idx="1"/>
+          </p:nvPr>
+        </p:nvSpPr>
+        <p:spPr/>
+        <p:txBody>
+          <a:bodyPr/>
+          <a:lstStyle/>
+          <a:p>
+            <a:endParaRPr lang="ru-RU"/>
+          </a:p>
+        </p:txBody>
+      </p:sp>
+      <p:sp>
+        <p:nvSpPr>
+          <p:cNvPr id="4" name="Slide Number Placeholder 3"/>
+          <p:cNvSpPr>
+            <a:spLocks noGrp="1"/>
+          </p:cNvSpPr>
+          <p:nvPr>
+            <p:ph type="sldNum" sz="quarter" idx="10"/>
+          </p:nvPr>
+        </p:nvSpPr>
+        <p:spPr/>
+        <p:txBody>
+          <a:bodyPr/>
+          <a:lstStyle/>
+          <a:p>
+            <a:fld id="{7F33120B-582B-4354-977D-A474A534F6B9}" type="slidenum">
+              <a:rPr lang="ru-RU" smtClean="0"/>
+              <a:t>37</a:t>
             </a:fld>
             <a:endParaRPr lang="ru-RU"/>
           </a:p>
@@ -4624,7 +4731,7 @@
           <a:p>
             <a:fld id="{12C63722-5D9F-4E99-9720-9B6A0C7BB1C9}" type="datetimeFigureOut">
               <a:rPr lang="ru-RU" smtClean="0"/>
-              <a:t>24.10.2018</a:t>
+              <a:t>30.09.2019</a:t>
             </a:fld>
             <a:endParaRPr lang="ru-RU"/>
           </a:p>
@@ -4794,7 +4901,7 @@
           <a:p>
             <a:fld id="{12C63722-5D9F-4E99-9720-9B6A0C7BB1C9}" type="datetimeFigureOut">
               <a:rPr lang="ru-RU" smtClean="0"/>
-              <a:t>24.10.2018</a:t>
+              <a:t>30.09.2019</a:t>
             </a:fld>
             <a:endParaRPr lang="ru-RU"/>
           </a:p>
@@ -4974,7 +5081,7 @@
           <a:p>
             <a:fld id="{12C63722-5D9F-4E99-9720-9B6A0C7BB1C9}" type="datetimeFigureOut">
               <a:rPr lang="ru-RU" smtClean="0"/>
-              <a:t>24.10.2018</a:t>
+              <a:t>30.09.2019</a:t>
             </a:fld>
             <a:endParaRPr lang="ru-RU"/>
           </a:p>
@@ -5166,7 +5273,7 @@
           <a:p>
             <a:fld id="{8C218C88-2408-4CFC-B25C-07450930B282}" type="datetimeFigureOut">
               <a:rPr lang="ru-RU" smtClean="0"/>
-              <a:t>24.10.2018</a:t>
+              <a:t>30.09.2019</a:t>
             </a:fld>
             <a:endParaRPr lang="ru-RU"/>
           </a:p>
@@ -5336,7 +5443,7 @@
           <a:p>
             <a:fld id="{8C218C88-2408-4CFC-B25C-07450930B282}" type="datetimeFigureOut">
               <a:rPr lang="ru-RU" smtClean="0"/>
-              <a:t>24.10.2018</a:t>
+              <a:t>30.09.2019</a:t>
             </a:fld>
             <a:endParaRPr lang="ru-RU"/>
           </a:p>
@@ -5582,7 +5689,7 @@
           <a:p>
             <a:fld id="{8C218C88-2408-4CFC-B25C-07450930B282}" type="datetimeFigureOut">
               <a:rPr lang="ru-RU" smtClean="0"/>
-              <a:t>24.10.2018</a:t>
+              <a:t>30.09.2019</a:t>
             </a:fld>
             <a:endParaRPr lang="ru-RU"/>
           </a:p>
@@ -5814,7 +5921,7 @@
           <a:p>
             <a:fld id="{8C218C88-2408-4CFC-B25C-07450930B282}" type="datetimeFigureOut">
               <a:rPr lang="ru-RU" smtClean="0"/>
-              <a:t>24.10.2018</a:t>
+              <a:t>30.09.2019</a:t>
             </a:fld>
             <a:endParaRPr lang="ru-RU"/>
           </a:p>
@@ -6181,7 +6288,7 @@
           <a:p>
             <a:fld id="{8C218C88-2408-4CFC-B25C-07450930B282}" type="datetimeFigureOut">
               <a:rPr lang="ru-RU" smtClean="0"/>
-              <a:t>24.10.2018</a:t>
+              <a:t>30.09.2019</a:t>
             </a:fld>
             <a:endParaRPr lang="ru-RU"/>
           </a:p>
@@ -6299,7 +6406,7 @@
           <a:p>
             <a:fld id="{8C218C88-2408-4CFC-B25C-07450930B282}" type="datetimeFigureOut">
               <a:rPr lang="ru-RU" smtClean="0"/>
-              <a:t>24.10.2018</a:t>
+              <a:t>30.09.2019</a:t>
             </a:fld>
             <a:endParaRPr lang="ru-RU"/>
           </a:p>
@@ -6394,7 +6501,7 @@
           <a:p>
             <a:fld id="{8C218C88-2408-4CFC-B25C-07450930B282}" type="datetimeFigureOut">
               <a:rPr lang="ru-RU" smtClean="0"/>
-              <a:t>24.10.2018</a:t>
+              <a:t>30.09.2019</a:t>
             </a:fld>
             <a:endParaRPr lang="ru-RU"/>
           </a:p>
@@ -6671,7 +6778,7 @@
           <a:p>
             <a:fld id="{8C218C88-2408-4CFC-B25C-07450930B282}" type="datetimeFigureOut">
               <a:rPr lang="ru-RU" smtClean="0"/>
-              <a:t>24.10.2018</a:t>
+              <a:t>30.09.2019</a:t>
             </a:fld>
             <a:endParaRPr lang="ru-RU"/>
           </a:p>
@@ -6841,7 +6948,7 @@
           <a:p>
             <a:fld id="{12C63722-5D9F-4E99-9720-9B6A0C7BB1C9}" type="datetimeFigureOut">
               <a:rPr lang="ru-RU" smtClean="0"/>
-              <a:t>24.10.2018</a:t>
+              <a:t>30.09.2019</a:t>
             </a:fld>
             <a:endParaRPr lang="ru-RU"/>
           </a:p>
@@ -7094,7 +7201,7 @@
           <a:p>
             <a:fld id="{8C218C88-2408-4CFC-B25C-07450930B282}" type="datetimeFigureOut">
               <a:rPr lang="ru-RU" smtClean="0"/>
-              <a:t>24.10.2018</a:t>
+              <a:t>30.09.2019</a:t>
             </a:fld>
             <a:endParaRPr lang="ru-RU"/>
           </a:p>
@@ -7264,7 +7371,7 @@
           <a:p>
             <a:fld id="{8C218C88-2408-4CFC-B25C-07450930B282}" type="datetimeFigureOut">
               <a:rPr lang="ru-RU" smtClean="0"/>
-              <a:t>24.10.2018</a:t>
+              <a:t>30.09.2019</a:t>
             </a:fld>
             <a:endParaRPr lang="ru-RU"/>
           </a:p>
@@ -7444,7 +7551,7 @@
           <a:p>
             <a:fld id="{8C218C88-2408-4CFC-B25C-07450930B282}" type="datetimeFigureOut">
               <a:rPr lang="ru-RU" smtClean="0"/>
-              <a:t>24.10.2018</a:t>
+              <a:t>30.09.2019</a:t>
             </a:fld>
             <a:endParaRPr lang="ru-RU"/>
           </a:p>
@@ -7690,7 +7797,7 @@
           <a:p>
             <a:fld id="{12C63722-5D9F-4E99-9720-9B6A0C7BB1C9}" type="datetimeFigureOut">
               <a:rPr lang="ru-RU" smtClean="0"/>
-              <a:t>24.10.2018</a:t>
+              <a:t>30.09.2019</a:t>
             </a:fld>
             <a:endParaRPr lang="ru-RU"/>
           </a:p>
@@ -7930,7 +8037,7 @@
           <a:p>
             <a:fld id="{12C63722-5D9F-4E99-9720-9B6A0C7BB1C9}" type="datetimeFigureOut">
               <a:rPr lang="ru-RU" smtClean="0"/>
-              <a:t>24.10.2018</a:t>
+              <a:t>30.09.2019</a:t>
             </a:fld>
             <a:endParaRPr lang="ru-RU"/>
           </a:p>
@@ -8297,7 +8404,7 @@
           <a:p>
             <a:fld id="{12C63722-5D9F-4E99-9720-9B6A0C7BB1C9}" type="datetimeFigureOut">
               <a:rPr lang="ru-RU" smtClean="0"/>
-              <a:t>24.10.2018</a:t>
+              <a:t>30.09.2019</a:t>
             </a:fld>
             <a:endParaRPr lang="ru-RU"/>
           </a:p>
@@ -8415,7 +8522,7 @@
           <a:p>
             <a:fld id="{12C63722-5D9F-4E99-9720-9B6A0C7BB1C9}" type="datetimeFigureOut">
               <a:rPr lang="ru-RU" smtClean="0"/>
-              <a:t>24.10.2018</a:t>
+              <a:t>30.09.2019</a:t>
             </a:fld>
             <a:endParaRPr lang="ru-RU"/>
           </a:p>
@@ -8510,7 +8617,7 @@
           <a:p>
             <a:fld id="{12C63722-5D9F-4E99-9720-9B6A0C7BB1C9}" type="datetimeFigureOut">
               <a:rPr lang="ru-RU" smtClean="0"/>
-              <a:t>24.10.2018</a:t>
+              <a:t>30.09.2019</a:t>
             </a:fld>
             <a:endParaRPr lang="ru-RU"/>
           </a:p>
@@ -8787,7 +8894,7 @@
           <a:p>
             <a:fld id="{12C63722-5D9F-4E99-9720-9B6A0C7BB1C9}" type="datetimeFigureOut">
               <a:rPr lang="ru-RU" smtClean="0"/>
-              <a:t>24.10.2018</a:t>
+              <a:t>30.09.2019</a:t>
             </a:fld>
             <a:endParaRPr lang="ru-RU"/>
           </a:p>
@@ -9040,7 +9147,7 @@
           <a:p>
             <a:fld id="{12C63722-5D9F-4E99-9720-9B6A0C7BB1C9}" type="datetimeFigureOut">
               <a:rPr lang="ru-RU" smtClean="0"/>
-              <a:t>24.10.2018</a:t>
+              <a:t>30.09.2019</a:t>
             </a:fld>
             <a:endParaRPr lang="ru-RU"/>
           </a:p>
@@ -9253,7 +9360,7 @@
           <a:p>
             <a:fld id="{12C63722-5D9F-4E99-9720-9B6A0C7BB1C9}" type="datetimeFigureOut">
               <a:rPr lang="ru-RU" smtClean="0"/>
-              <a:t>24.10.2018</a:t>
+              <a:t>30.09.2019</a:t>
             </a:fld>
             <a:endParaRPr lang="ru-RU"/>
           </a:p>
@@ -9793,7 +9900,7 @@
           <a:p>
             <a:fld id="{8C218C88-2408-4CFC-B25C-07450930B282}" type="datetimeFigureOut">
               <a:rPr lang="ru-RU" smtClean="0"/>
-              <a:t>24.10.2018</a:t>
+              <a:t>30.09.2019</a:t>
             </a:fld>
             <a:endParaRPr lang="ru-RU"/>
           </a:p>
@@ -10434,6 +10541,13 @@
   <p:clrMapOvr>
     <a:masterClrMapping/>
   </p:clrMapOvr>
+  <p:timing>
+    <p:tnLst>
+      <p:par>
+        <p:cTn id="1" dur="indefinite" restart="never" nodeType="tmRoot"/>
+      </p:par>
+    </p:tnLst>
+  </p:timing>
 </p:sld>
 </file>
 
@@ -11089,6 +11203,10 @@
                         <a:rPr lang="en-US" dirty="0" err="1"/>
                         <a:t>Inode</a:t>
                       </a:r>
+                      <a:r>
+                        <a:rPr lang="en-US" dirty="0"/>
+                        <a:t/>
+                      </a:r>
                       <a:br>
                         <a:rPr lang="en-US" dirty="0"/>
                       </a:br>
@@ -11641,12 +11759,20 @@
                       <a:br>
                         <a:rPr lang="en-US" baseline="0" dirty="0"/>
                       </a:br>
+                      <a:r>
+                        <a:rPr lang="en-US" baseline="0" dirty="0"/>
+                        <a:t/>
+                      </a:r>
                       <a:br>
                         <a:rPr lang="en-US" baseline="0" dirty="0"/>
                       </a:br>
                       <a:r>
                         <a:rPr lang="ru-RU" baseline="0" dirty="0"/>
                         <a:t>Тут выключилось питание</a:t>
+                      </a:r>
+                      <a:r>
+                        <a:rPr lang="en-US" baseline="0" dirty="0"/>
+                        <a:t/>
                       </a:r>
                       <a:br>
                         <a:rPr lang="en-US" baseline="0" dirty="0"/>
@@ -12548,12 +12674,20 @@
                       <a:br>
                         <a:rPr lang="en-US" baseline="0" dirty="0"/>
                       </a:br>
+                      <a:r>
+                        <a:rPr lang="en-US" baseline="0" dirty="0"/>
+                        <a:t/>
+                      </a:r>
                       <a:br>
                         <a:rPr lang="en-US" baseline="0" dirty="0"/>
                       </a:br>
                       <a:r>
                         <a:rPr lang="ru-RU" baseline="0" dirty="0"/>
                         <a:t>Тут выключилось питание</a:t>
+                      </a:r>
+                      <a:r>
+                        <a:rPr lang="en-US" baseline="0" dirty="0"/>
+                        <a:t/>
                       </a:r>
                       <a:br>
                         <a:rPr lang="en-US" baseline="0" dirty="0"/>
@@ -14369,6 +14503,10 @@
                       <a:br>
                         <a:rPr lang="en-US" dirty="0"/>
                       </a:br>
+                      <a:r>
+                        <a:rPr lang="en-US" dirty="0"/>
+                        <a:t/>
+                      </a:r>
                       <a:br>
                         <a:rPr lang="en-US" dirty="0"/>
                       </a:br>
@@ -14408,9 +14546,17 @@
                       <a:br>
                         <a:rPr lang="en-US" dirty="0"/>
                       </a:br>
+                      <a:r>
+                        <a:rPr lang="en-US" dirty="0"/>
+                        <a:t/>
+                      </a:r>
                       <a:br>
                         <a:rPr lang="en-US" dirty="0"/>
                       </a:br>
+                      <a:r>
+                        <a:rPr lang="en-US" dirty="0"/>
+                        <a:t/>
+                      </a:r>
                       <a:br>
                         <a:rPr lang="en-US" dirty="0"/>
                       </a:br>
@@ -14440,6 +14586,10 @@
                         <a:rPr lang="en-US" dirty="0" err="1"/>
                         <a:t>Inode</a:t>
                       </a:r>
+                      <a:r>
+                        <a:rPr lang="en-US" dirty="0"/>
+                        <a:t/>
+                      </a:r>
                       <a:br>
                         <a:rPr lang="en-US" dirty="0"/>
                       </a:br>
@@ -14450,9 +14600,17 @@
                       <a:br>
                         <a:rPr lang="en-US" dirty="0"/>
                       </a:br>
+                      <a:r>
+                        <a:rPr lang="en-US" dirty="0"/>
+                        <a:t/>
+                      </a:r>
                       <a:br>
                         <a:rPr lang="en-US" dirty="0"/>
                       </a:br>
+                      <a:r>
+                        <a:rPr lang="en-US" dirty="0"/>
+                        <a:t/>
+                      </a:r>
                       <a:br>
                         <a:rPr lang="en-US" dirty="0"/>
                       </a:br>
@@ -14507,12 +14665,24 @@
                       <a:br>
                         <a:rPr lang="en-US" baseline="0" dirty="0"/>
                       </a:br>
+                      <a:r>
+                        <a:rPr lang="en-US" baseline="0" dirty="0"/>
+                        <a:t/>
+                      </a:r>
                       <a:br>
                         <a:rPr lang="en-US" baseline="0" dirty="0"/>
                       </a:br>
+                      <a:r>
+                        <a:rPr lang="en-US" baseline="0" dirty="0"/>
+                        <a:t/>
+                      </a:r>
                       <a:br>
                         <a:rPr lang="en-US" baseline="0" dirty="0"/>
                       </a:br>
+                      <a:r>
+                        <a:rPr lang="en-US" baseline="0" dirty="0"/>
+                        <a:t/>
+                      </a:r>
                       <a:br>
                         <a:rPr lang="en-US" baseline="0" dirty="0"/>
                       </a:br>
@@ -15180,14 +15350,14 @@
       </p:graphicFrame>
       <p:graphicFrame>
         <p:nvGraphicFramePr>
-          <p:cNvPr id="7" name="Table 6"/>
+          <p:cNvPr id="8" name="Table 7"/>
           <p:cNvGraphicFramePr>
             <a:graphicFrameLocks noGrp="1"/>
           </p:cNvGraphicFramePr>
           <p:nvPr>
             <p:extLst>
               <p:ext uri="{D42A27DB-BD31-4B8C-83A1-F6EECF244321}">
-                <p14:modId xmlns:p14="http://schemas.microsoft.com/office/powerpoint/2010/main" val="2250020400"/>
+                <p14:modId xmlns:p14="http://schemas.microsoft.com/office/powerpoint/2010/main" val="2492696128"/>
               </p:ext>
             </p:extLst>
           </p:nvPr>
@@ -15280,6 +15450,10 @@
                       <a:br>
                         <a:rPr lang="en-US" dirty="0"/>
                       </a:br>
+                      <a:r>
+                        <a:rPr lang="en-US" dirty="0"/>
+                        <a:t/>
+                      </a:r>
                       <a:br>
                         <a:rPr lang="en-US" dirty="0"/>
                       </a:br>
@@ -15319,9 +15493,17 @@
                       <a:br>
                         <a:rPr lang="en-US" dirty="0"/>
                       </a:br>
+                      <a:r>
+                        <a:rPr lang="en-US" dirty="0"/>
+                        <a:t/>
+                      </a:r>
                       <a:br>
                         <a:rPr lang="en-US" dirty="0"/>
                       </a:br>
+                      <a:r>
+                        <a:rPr lang="en-US" dirty="0"/>
+                        <a:t/>
+                      </a:r>
                       <a:br>
                         <a:rPr lang="en-US" dirty="0"/>
                       </a:br>
@@ -15351,6 +15533,10 @@
                         <a:rPr lang="en-US" dirty="0" err="1"/>
                         <a:t>Inode</a:t>
                       </a:r>
+                      <a:r>
+                        <a:rPr lang="en-US" dirty="0"/>
+                        <a:t/>
+                      </a:r>
                       <a:br>
                         <a:rPr lang="en-US" dirty="0"/>
                       </a:br>
@@ -15361,9 +15547,17 @@
                       <a:br>
                         <a:rPr lang="en-US" dirty="0"/>
                       </a:br>
+                      <a:r>
+                        <a:rPr lang="en-US" dirty="0"/>
+                        <a:t/>
+                      </a:r>
                       <a:br>
                         <a:rPr lang="en-US" dirty="0"/>
                       </a:br>
+                      <a:r>
+                        <a:rPr lang="en-US" dirty="0"/>
+                        <a:t/>
+                      </a:r>
                       <a:br>
                         <a:rPr lang="en-US" dirty="0"/>
                       </a:br>
@@ -15418,12 +15612,24 @@
                       <a:br>
                         <a:rPr lang="en-US" baseline="0" dirty="0"/>
                       </a:br>
+                      <a:r>
+                        <a:rPr lang="en-US" baseline="0" dirty="0"/>
+                        <a:t/>
+                      </a:r>
                       <a:br>
                         <a:rPr lang="en-US" baseline="0" dirty="0"/>
                       </a:br>
+                      <a:r>
+                        <a:rPr lang="en-US" baseline="0" dirty="0"/>
+                        <a:t/>
+                      </a:r>
                       <a:br>
                         <a:rPr lang="en-US" baseline="0" dirty="0"/>
                       </a:br>
+                      <a:r>
+                        <a:rPr lang="en-US" baseline="0" dirty="0"/>
+                        <a:t/>
+                      </a:r>
                       <a:br>
                         <a:rPr lang="en-US" baseline="0" dirty="0"/>
                       </a:br>
@@ -15456,14 +15662,14 @@
       </p:graphicFrame>
       <p:graphicFrame>
         <p:nvGraphicFramePr>
-          <p:cNvPr id="9" name="Table 8"/>
+          <p:cNvPr id="10" name="Table 9"/>
           <p:cNvGraphicFramePr>
             <a:graphicFrameLocks noGrp="1"/>
           </p:cNvGraphicFramePr>
           <p:nvPr>
             <p:extLst>
               <p:ext uri="{D42A27DB-BD31-4B8C-83A1-F6EECF244321}">
-                <p14:modId xmlns:p14="http://schemas.microsoft.com/office/powerpoint/2010/main" val="473598017"/>
+                <p14:modId xmlns:p14="http://schemas.microsoft.com/office/powerpoint/2010/main" val="906948200"/>
               </p:ext>
             </p:extLst>
           </p:nvPr>
@@ -17765,6 +17971,13 @@
   <p:clrMapOvr>
     <a:masterClrMapping/>
   </p:clrMapOvr>
+  <p:timing>
+    <p:tnLst>
+      <p:par>
+        <p:cTn id="1" dur="indefinite" restart="never" nodeType="tmRoot"/>
+      </p:par>
+    </p:tnLst>
+  </p:timing>
 </p:sld>
 </file>
 
@@ -18453,11 +18666,7 @@
             <a:graphicFrameLocks noGrp="1"/>
           </p:cNvGraphicFramePr>
           <p:nvPr>
-            <p:extLst>
-              <p:ext uri="{D42A27DB-BD31-4B8C-83A1-F6EECF244321}">
-                <p14:modId xmlns:p14="http://schemas.microsoft.com/office/powerpoint/2010/main" val="2281224332"/>
-              </p:ext>
-            </p:extLst>
+            <p:extLst/>
           </p:nvPr>
         </p:nvGraphicFramePr>
         <p:xfrm>
@@ -18515,11 +18724,7 @@
             <a:graphicFrameLocks noGrp="1"/>
           </p:cNvGraphicFramePr>
           <p:nvPr>
-            <p:extLst>
-              <p:ext uri="{D42A27DB-BD31-4B8C-83A1-F6EECF244321}">
-                <p14:modId xmlns:p14="http://schemas.microsoft.com/office/powerpoint/2010/main" val="4164474727"/>
-              </p:ext>
-            </p:extLst>
+            <p:extLst/>
           </p:nvPr>
         </p:nvGraphicFramePr>
         <p:xfrm>
@@ -18578,14 +18783,14 @@
           <p:nvPr>
             <p:extLst>
               <p:ext uri="{D42A27DB-BD31-4B8C-83A1-F6EECF244321}">
-                <p14:modId xmlns:p14="http://schemas.microsoft.com/office/powerpoint/2010/main" val="2104443981"/>
+                <p14:modId xmlns:p14="http://schemas.microsoft.com/office/powerpoint/2010/main" val="3198980611"/>
               </p:ext>
             </p:extLst>
           </p:nvPr>
         </p:nvGraphicFramePr>
         <p:xfrm>
           <a:off x="0" y="365762"/>
-          <a:ext cx="12192000" cy="3383280"/>
+          <a:ext cx="12192000" cy="5852160"/>
         </p:xfrm>
         <a:graphic>
           <a:graphicData uri="http://schemas.openxmlformats.org/drawingml/2006/table">
@@ -18635,11 +18840,11 @@
                     <a:p>
                       <a:r>
                         <a:rPr lang="ru-RU" dirty="0"/>
-                        <a:t>Рассмотрим пример добавления данных в конец файла на </a:t>
-                      </a:r>
-                      <a:r>
-                        <a:rPr lang="en-US" dirty="0"/>
-                        <a:t>XFS.</a:t>
+                        <a:t>Журналирование, предложенное</a:t>
+                      </a:r>
+                      <a:r>
+                        <a:rPr lang="ru-RU" baseline="0" dirty="0"/>
+                        <a:t> на прошлом слайде, удваивает число блоков, которые надо записать на диск.</a:t>
                       </a:r>
                       <a:endParaRPr lang="ru-RU" dirty="0"/>
                     </a:p>
@@ -18659,8 +18864,48 @@
                     <a:lstStyle/>
                     <a:p>
                       <a:r>
-                        <a:rPr lang="en-US" dirty="0"/>
-                        <a:t>XFS</a:t>
+                        <a:rPr lang="ru-RU" dirty="0"/>
+                        <a:t>Это не так плохо для скорости: запись в журнал последовательная.</a:t>
+                      </a:r>
+                    </a:p>
+                  </a:txBody>
+                  <a:tcPr/>
+                </a:tc>
+                <a:extLst>
+                  <a:ext uri="{0D108BD9-81ED-4DB2-BD59-A6C34878D82A}">
+                    <a16:rowId xmlns:a16="http://schemas.microsoft.com/office/drawing/2014/main" val="10002"/>
+                  </a:ext>
+                </a:extLst>
+              </a:tr>
+              <a:tr h="0">
+                <a:tc>
+                  <a:txBody>
+                    <a:bodyPr/>
+                    <a:lstStyle/>
+                    <a:p>
+                      <a:r>
+                        <a:rPr lang="ru-RU" dirty="0"/>
+                        <a:t>Но всё равно хочется журналировать поменьше данных.</a:t>
+                      </a:r>
+                    </a:p>
+                  </a:txBody>
+                  <a:tcPr/>
+                </a:tc>
+                <a:extLst>
+                  <a:ext uri="{0D108BD9-81ED-4DB2-BD59-A6C34878D82A}">
+                    <a16:rowId xmlns:a16="http://schemas.microsoft.com/office/drawing/2014/main" val="10003"/>
+                  </a:ext>
+                </a:extLst>
+              </a:tr>
+              <a:tr h="0">
+                <a:tc>
+                  <a:txBody>
+                    <a:bodyPr/>
+                    <a:lstStyle/>
+                    <a:p>
+                      <a:r>
+                        <a:rPr lang="ru-RU" dirty="0"/>
+                        <a:t>Идея:</a:t>
                       </a:r>
                     </a:p>
                     <a:p>
@@ -18670,60 +18915,11 @@
                       </a:pPr>
                       <a:r>
                         <a:rPr lang="ru-RU" dirty="0"/>
-                        <a:t>Найдёт свободный нулевой блок,</a:t>
-                      </a:r>
-                    </a:p>
-                    <a:p>
-                      <a:pPr marL="285750" indent="-285750">
-                        <a:buFont typeface="Arial" panose="020B0604020202020204" pitchFamily="34" charset="0"/>
-                        <a:buChar char="•"/>
-                      </a:pPr>
-                      <a:r>
-                        <a:rPr lang="ru-RU" dirty="0"/>
-                        <a:t>Зажурналирует обновление </a:t>
-                      </a:r>
-                      <a:r>
-                        <a:rPr lang="en-US" dirty="0"/>
-                        <a:t>block bitmap</a:t>
-                      </a:r>
-                      <a:r>
-                        <a:rPr lang="ru-RU" dirty="0"/>
-                        <a:t>, </a:t>
-                      </a:r>
-                      <a:r>
-                        <a:rPr lang="en-US" dirty="0" err="1"/>
-                        <a:t>inode</a:t>
-                      </a:r>
-                      <a:r>
-                        <a:rPr lang="en-US" dirty="0"/>
-                        <a:t>,</a:t>
-                      </a:r>
-                      <a:r>
-                        <a:rPr lang="ru-RU" dirty="0"/>
-                        <a:t> и </a:t>
-                      </a:r>
-                      <a:r>
-                        <a:rPr lang="en-US" dirty="0"/>
-                        <a:t>extent</a:t>
-                      </a:r>
-                      <a:r>
-                        <a:rPr lang="en-US" baseline="0" dirty="0"/>
-                        <a:t> tree,</a:t>
-                      </a:r>
-                      <a:endParaRPr lang="en-US" dirty="0"/>
-                    </a:p>
-                    <a:p>
-                      <a:pPr marL="285750" indent="-285750">
-                        <a:buFont typeface="Arial" panose="020B0604020202020204" pitchFamily="34" charset="0"/>
-                        <a:buChar char="•"/>
-                      </a:pPr>
-                      <a:r>
-                        <a:rPr lang="ru-RU" dirty="0"/>
-                        <a:t>Даст</a:t>
+                        <a:t>Будем журналировать</a:t>
                       </a:r>
                       <a:r>
                         <a:rPr lang="ru-RU" baseline="0" dirty="0"/>
-                        <a:t> пользовательскому приложению писать в выделенные блоки.</a:t>
+                        <a:t> только метаданные ФС</a:t>
                       </a:r>
                     </a:p>
                     <a:p>
@@ -18740,7 +18936,31 @@
                       </a:pPr>
                       <a:r>
                         <a:rPr lang="ru-RU" baseline="0" dirty="0"/>
-                        <a:t>В журнал попадут только изменения метаданных ФС (килобайты). Запись же пользовательских данных (потенциально – гигабайты) пойдёт мимо журнала.</a:t>
+                        <a:t>В результате, после </a:t>
+                      </a:r>
+                      <a:r>
+                        <a:rPr lang="en-US" baseline="0" dirty="0"/>
+                        <a:t>crash recovery </a:t>
+                      </a:r>
+                      <a:r>
+                        <a:rPr lang="ru-RU" baseline="0" dirty="0"/>
+                        <a:t>мы будем получать неразломанную ФС: без потерянных блоков и инод, без </a:t>
+                      </a:r>
+                      <a:r>
+                        <a:rPr lang="en-US" baseline="0" dirty="0" err="1"/>
+                        <a:t>dir_entry</a:t>
+                      </a:r>
+                      <a:r>
+                        <a:rPr lang="en-US" baseline="0" dirty="0"/>
+                        <a:t>, </a:t>
+                      </a:r>
+                      <a:r>
+                        <a:rPr lang="ru-RU" baseline="0" dirty="0"/>
+                        <a:t>ведущих в никуда, </a:t>
+                      </a:r>
+                      <a:r>
+                        <a:rPr lang="en-US" baseline="0" dirty="0"/>
+                        <a:t>etc.</a:t>
                       </a:r>
                     </a:p>
                     <a:p>
@@ -18748,7 +18968,7 @@
                         <a:buFont typeface="Arial" panose="020B0604020202020204" pitchFamily="34" charset="0"/>
                         <a:buNone/>
                       </a:pPr>
-                      <a:endParaRPr lang="ru-RU" baseline="0" dirty="0"/>
+                      <a:endParaRPr lang="en-US" baseline="0" dirty="0"/>
                     </a:p>
                     <a:p>
                       <a:pPr marL="0" indent="0">
@@ -18757,7 +18977,15 @@
                       </a:pPr>
                       <a:r>
                         <a:rPr lang="ru-RU" baseline="0" dirty="0"/>
-                        <a:t>Что произойдёт при падении ОС во время такой записи в файл?</a:t>
+                        <a:t>Но: ФС не предоставляет </a:t>
+                      </a:r>
+                      <a:r>
+                        <a:rPr lang="ru-RU" b="1" baseline="0" dirty="0"/>
+                        <a:t>никаких</a:t>
+                      </a:r>
+                      <a:r>
+                        <a:rPr lang="ru-RU" baseline="0" dirty="0"/>
+                        <a:t> гарантий о том, что будет с пользовательскими данными.</a:t>
                       </a:r>
                       <a:endParaRPr lang="ru-RU" dirty="0"/>
                     </a:p>
@@ -18766,7 +18994,178 @@
                 </a:tc>
                 <a:extLst>
                   <a:ext uri="{0D108BD9-81ED-4DB2-BD59-A6C34878D82A}">
-                    <a16:rowId xmlns:a16="http://schemas.microsoft.com/office/drawing/2014/main" val="10002"/>
+                    <a16:rowId xmlns:a16="http://schemas.microsoft.com/office/drawing/2014/main" val="10004"/>
+                  </a:ext>
+                </a:extLst>
+              </a:tr>
+              <a:tr h="0">
+                <a:tc>
+                  <a:txBody>
+                    <a:bodyPr/>
+                    <a:lstStyle/>
+                    <a:p>
+                      <a:pPr marL="0" indent="0">
+                        <a:buFont typeface="Arial" panose="020B0604020202020204" pitchFamily="34" charset="0"/>
+                        <a:buNone/>
+                      </a:pPr>
+                      <a:r>
+                        <a:rPr lang="ru-RU" dirty="0" smtClean="0"/>
+                        <a:t>В </a:t>
+                      </a:r>
+                      <a:r>
+                        <a:rPr lang="ru-RU" baseline="0" dirty="0" smtClean="0"/>
+                        <a:t>файловых системах </a:t>
+                      </a:r>
+                      <a:r>
+                        <a:rPr lang="en-US" baseline="0" dirty="0" smtClean="0"/>
+                        <a:t>ext3/ext4 </a:t>
+                      </a:r>
+                      <a:r>
+                        <a:rPr lang="ru-RU" baseline="0" dirty="0" smtClean="0"/>
+                        <a:t>есть такие режимы </a:t>
+                      </a:r>
+                      <a:r>
+                        <a:rPr lang="ru-RU" baseline="0" dirty="0" err="1" smtClean="0"/>
+                        <a:t>журналирования</a:t>
+                      </a:r>
+                      <a:r>
+                        <a:rPr lang="en-US" baseline="0" dirty="0" smtClean="0"/>
+                        <a:t> (</a:t>
+                      </a:r>
+                      <a:r>
+                        <a:rPr lang="ru-RU" baseline="0" dirty="0" smtClean="0"/>
+                        <a:t>указываются при монтировании):</a:t>
+                      </a:r>
+                    </a:p>
+                    <a:p>
+                      <a:pPr marL="285750" indent="-285750">
+                        <a:buFont typeface="Arial" panose="020B0604020202020204" pitchFamily="34" charset="0"/>
+                        <a:buChar char="•"/>
+                      </a:pPr>
+                      <a:r>
+                        <a:rPr lang="en-US" dirty="0" smtClean="0"/>
+                        <a:t>data</a:t>
+                      </a:r>
+                      <a:r>
+                        <a:rPr lang="en-US" baseline="0" dirty="0" smtClean="0"/>
+                        <a:t>=</a:t>
+                      </a:r>
+                      <a:r>
+                        <a:rPr lang="en-US" baseline="0" dirty="0" err="1" smtClean="0"/>
+                        <a:t>writeback</a:t>
+                      </a:r>
+                      <a:r>
+                        <a:rPr lang="ru-RU" baseline="0" dirty="0" smtClean="0"/>
+                        <a:t> (</a:t>
+                      </a:r>
+                      <a:r>
+                        <a:rPr lang="ru-RU" baseline="0" dirty="0" err="1" smtClean="0"/>
+                        <a:t>журналируются</a:t>
+                      </a:r>
+                      <a:r>
+                        <a:rPr lang="ru-RU" baseline="0" dirty="0" smtClean="0"/>
+                        <a:t> только метаданные, пользовательские данные записываются только в блоки с данными)</a:t>
+                      </a:r>
+                      <a:endParaRPr lang="en-US" baseline="0" dirty="0" smtClean="0"/>
+                    </a:p>
+                    <a:p>
+                      <a:pPr marL="285750" indent="-285750">
+                        <a:buFont typeface="Arial" panose="020B0604020202020204" pitchFamily="34" charset="0"/>
+                        <a:buChar char="•"/>
+                      </a:pPr>
+                      <a:r>
+                        <a:rPr lang="en-US" baseline="0" dirty="0" smtClean="0"/>
+                        <a:t>data</a:t>
+                      </a:r>
+                      <a:r>
+                        <a:rPr lang="ru-RU" baseline="0" dirty="0" smtClean="0"/>
+                        <a:t>=</a:t>
+                      </a:r>
+                      <a:r>
+                        <a:rPr lang="en-US" baseline="0" dirty="0" smtClean="0"/>
+                        <a:t>ordered</a:t>
+                      </a:r>
+                      <a:r>
+                        <a:rPr lang="ru-RU" baseline="0" dirty="0" smtClean="0"/>
+                        <a:t> (</a:t>
+                      </a:r>
+                      <a:r>
+                        <a:rPr lang="ru-RU" baseline="0" dirty="0" err="1" smtClean="0"/>
+                        <a:t>журналируются</a:t>
+                      </a:r>
+                      <a:r>
+                        <a:rPr lang="ru-RU" baseline="0" dirty="0" smtClean="0"/>
+                        <a:t> только метаданные, но только после того, как </a:t>
+                      </a:r>
+                      <a:r>
+                        <a:rPr lang="ru-RU" baseline="0" dirty="0" err="1" smtClean="0"/>
+                        <a:t>соответсвующие</a:t>
+                      </a:r>
+                      <a:r>
+                        <a:rPr lang="ru-RU" baseline="0" dirty="0" smtClean="0"/>
+                        <a:t> пользовательские данные записаны на диск)</a:t>
+                      </a:r>
+                      <a:endParaRPr lang="en-US" baseline="0" dirty="0" smtClean="0"/>
+                    </a:p>
+                    <a:p>
+                      <a:pPr marL="285750" indent="-285750">
+                        <a:buFont typeface="Arial" panose="020B0604020202020204" pitchFamily="34" charset="0"/>
+                        <a:buChar char="•"/>
+                      </a:pPr>
+                      <a:r>
+                        <a:rPr lang="en-US" baseline="0" dirty="0" smtClean="0"/>
+                        <a:t>data</a:t>
+                      </a:r>
+                      <a:r>
+                        <a:rPr lang="ru-RU" baseline="0" dirty="0" smtClean="0"/>
+                        <a:t>=</a:t>
+                      </a:r>
+                      <a:r>
+                        <a:rPr lang="en-US" baseline="0" dirty="0" smtClean="0"/>
+                        <a:t>journal</a:t>
+                      </a:r>
+                      <a:r>
+                        <a:rPr lang="ru-RU" baseline="0" dirty="0" smtClean="0"/>
+                        <a:t> (</a:t>
+                      </a:r>
+                      <a:r>
+                        <a:rPr lang="ru-RU" baseline="0" dirty="0" err="1" smtClean="0"/>
+                        <a:t>журналируются</a:t>
+                      </a:r>
+                      <a:r>
+                        <a:rPr lang="ru-RU" baseline="0" dirty="0" smtClean="0"/>
+                        <a:t> и метаданные, и данные)</a:t>
+                      </a:r>
+                    </a:p>
+                    <a:p>
+                      <a:pPr marL="0" indent="0">
+                        <a:buFont typeface="Arial" panose="020B0604020202020204" pitchFamily="34" charset="0"/>
+                        <a:buNone/>
+                      </a:pPr>
+                      <a:r>
+                        <a:rPr lang="ru-RU" b="1" baseline="0" dirty="0" smtClean="0"/>
+                        <a:t>Вопрос: </a:t>
+                      </a:r>
+                      <a:r>
+                        <a:rPr lang="ru-RU" b="0" baseline="0" dirty="0" smtClean="0"/>
+                        <a:t>при каких из этих режимах гарантируется </a:t>
+                      </a:r>
+                      <a:r>
+                        <a:rPr lang="ru-RU" b="0" baseline="0" dirty="0" err="1" smtClean="0"/>
+                        <a:t>консистентность</a:t>
+                      </a:r>
+                      <a:r>
+                        <a:rPr lang="ru-RU" b="0" baseline="0" dirty="0" smtClean="0"/>
+                        <a:t> метаданных файловой системы? А пользовательских данных?</a:t>
+                      </a:r>
+                      <a:endParaRPr lang="en-US" b="1" baseline="0" dirty="0" smtClean="0"/>
+                    </a:p>
+                  </a:txBody>
+                  <a:tcPr/>
+                </a:tc>
+                <a:extLst>
+                  <a:ext uri="{0D108BD9-81ED-4DB2-BD59-A6C34878D82A}">
+                    <a16:rowId xmlns:a16="http://schemas.microsoft.com/office/drawing/2014/main" val="2992824579"/>
                   </a:ext>
                 </a:extLst>
               </a:tr>
@@ -18777,7 +19176,7 @@
     </p:spTree>
     <p:extLst>
       <p:ext uri="{BB962C8B-B14F-4D97-AF65-F5344CB8AC3E}">
-        <p14:creationId xmlns:p14="http://schemas.microsoft.com/office/powerpoint/2010/main" val="2189776760"/>
+        <p14:creationId xmlns:p14="http://schemas.microsoft.com/office/powerpoint/2010/main" val="1777427068"/>
       </p:ext>
     </p:extLst>
   </p:cSld>
@@ -18936,14 +19335,14 @@
           <p:nvPr>
             <p:extLst>
               <p:ext uri="{D42A27DB-BD31-4B8C-83A1-F6EECF244321}">
-                <p14:modId xmlns:p14="http://schemas.microsoft.com/office/powerpoint/2010/main" val="776145505"/>
+                <p14:modId xmlns:p14="http://schemas.microsoft.com/office/powerpoint/2010/main" val="573934058"/>
               </p:ext>
             </p:extLst>
           </p:nvPr>
         </p:nvGraphicFramePr>
         <p:xfrm>
           <a:off x="0" y="365762"/>
-          <a:ext cx="12192000" cy="3749040"/>
+          <a:ext cx="12192000" cy="3383280"/>
         </p:xfrm>
         <a:graphic>
           <a:graphicData uri="http://schemas.openxmlformats.org/drawingml/2006/table">
@@ -19027,8 +19426,8 @@
                         <a:buChar char="•"/>
                       </a:pPr>
                       <a:r>
-                        <a:rPr lang="ru-RU" dirty="0"/>
-                        <a:t>Найдёт свободный нулевой блок,</a:t>
+                        <a:rPr lang="ru-RU" dirty="0" smtClean="0"/>
+                        <a:t>Найдёт свободные нулевые блоки,</a:t>
                       </a:r>
                     </a:p>
                     <a:p>
@@ -19037,8 +19436,16 @@
                         <a:buChar char="•"/>
                       </a:pPr>
                       <a:r>
+                        <a:rPr lang="ru-RU" dirty="0" err="1" smtClean="0"/>
+                        <a:t>Зажурналирует</a:t>
+                      </a:r>
+                      <a:r>
+                        <a:rPr lang="ru-RU" dirty="0" smtClean="0"/>
+                        <a:t> </a:t>
+                      </a:r>
+                      <a:r>
                         <a:rPr lang="ru-RU" dirty="0"/>
-                        <a:t>Зажурналирует обновление </a:t>
+                        <a:t>обновление </a:t>
                       </a:r>
                       <a:r>
                         <a:rPr lang="en-US" dirty="0"/>
@@ -19125,35 +19532,6 @@
                 <a:extLst>
                   <a:ext uri="{0D108BD9-81ED-4DB2-BD59-A6C34878D82A}">
                     <a16:rowId xmlns:a16="http://schemas.microsoft.com/office/drawing/2014/main" val="10002"/>
-                  </a:ext>
-                </a:extLst>
-              </a:tr>
-              <a:tr h="0">
-                <a:tc>
-                  <a:txBody>
-                    <a:bodyPr/>
-                    <a:lstStyle/>
-                    <a:p>
-                      <a:pPr marL="0" indent="0">
-                        <a:buFont typeface="Arial" panose="020B0604020202020204" pitchFamily="34" charset="0"/>
-                        <a:buNone/>
-                      </a:pPr>
-                      <a:r>
-                        <a:rPr lang="ru-RU" dirty="0"/>
-                        <a:t>Получится подросший</a:t>
-                      </a:r>
-                      <a:r>
-                        <a:rPr lang="ru-RU" baseline="0" dirty="0"/>
-                        <a:t> в размере файл, в хвосте которого будет мусор.</a:t>
-                      </a:r>
-                      <a:endParaRPr lang="en-US" baseline="0" dirty="0"/>
-                    </a:p>
-                  </a:txBody>
-                  <a:tcPr/>
-                </a:tc>
-                <a:extLst>
-                  <a:ext uri="{0D108BD9-81ED-4DB2-BD59-A6C34878D82A}">
-                    <a16:rowId xmlns:a16="http://schemas.microsoft.com/office/drawing/2014/main" val="10003"/>
                   </a:ext>
                 </a:extLst>
               </a:tr>
@@ -19164,7 +19542,7 @@
     </p:spTree>
     <p:extLst>
       <p:ext uri="{BB962C8B-B14F-4D97-AF65-F5344CB8AC3E}">
-        <p14:creationId xmlns:p14="http://schemas.microsoft.com/office/powerpoint/2010/main" val="3303937950"/>
+        <p14:creationId xmlns:p14="http://schemas.microsoft.com/office/powerpoint/2010/main" val="2189776760"/>
       </p:ext>
     </p:extLst>
   </p:cSld>
@@ -19323,14 +19701,14 @@
           <p:nvPr>
             <p:extLst>
               <p:ext uri="{D42A27DB-BD31-4B8C-83A1-F6EECF244321}">
-                <p14:modId xmlns:p14="http://schemas.microsoft.com/office/powerpoint/2010/main" val="786980517"/>
+                <p14:modId xmlns:p14="http://schemas.microsoft.com/office/powerpoint/2010/main" val="3350385188"/>
               </p:ext>
             </p:extLst>
           </p:nvPr>
         </p:nvGraphicFramePr>
         <p:xfrm>
           <a:off x="0" y="365762"/>
-          <a:ext cx="12192000" cy="4663440"/>
+          <a:ext cx="12192000" cy="3749040"/>
         </p:xfrm>
         <a:graphic>
           <a:graphicData uri="http://schemas.openxmlformats.org/drawingml/2006/table">
@@ -19414,7 +19792,7 @@
                         <a:buChar char="•"/>
                       </a:pPr>
                       <a:r>
-                        <a:rPr lang="ru-RU" dirty="0"/>
+                        <a:rPr lang="ru-RU" dirty="0" smtClean="0"/>
                         <a:t>Найдёт свободные нулевые блоки,</a:t>
                       </a:r>
                     </a:p>
@@ -19424,8 +19802,16 @@
                         <a:buChar char="•"/>
                       </a:pPr>
                       <a:r>
+                        <a:rPr lang="ru-RU" dirty="0" err="1" smtClean="0"/>
+                        <a:t>Зажурналирует</a:t>
+                      </a:r>
+                      <a:r>
+                        <a:rPr lang="ru-RU" dirty="0" smtClean="0"/>
+                        <a:t> </a:t>
+                      </a:r>
+                      <a:r>
                         <a:rPr lang="ru-RU" dirty="0"/>
-                        <a:t>Зажурналирует обновление </a:t>
+                        <a:t>обновление </a:t>
                       </a:r>
                       <a:r>
                         <a:rPr lang="en-US" dirty="0"/>
@@ -19533,36 +19919,7 @@
                         <a:rPr lang="ru-RU" baseline="0" dirty="0"/>
                         <a:t> в размере файл, в хвосте которого будет мусор.</a:t>
                       </a:r>
-                    </a:p>
-                    <a:p>
-                      <a:pPr marL="0" indent="0">
-                        <a:buFont typeface="Arial" panose="020B0604020202020204" pitchFamily="34" charset="0"/>
-                        <a:buNone/>
-                      </a:pPr>
-                      <a:endParaRPr lang="ru-RU" baseline="0" dirty="0"/>
-                    </a:p>
-                    <a:p>
-                      <a:pPr marL="0" indent="0">
-                        <a:buFont typeface="Arial" panose="020B0604020202020204" pitchFamily="34" charset="0"/>
-                        <a:buNone/>
-                      </a:pPr>
-                      <a:r>
-                        <a:rPr lang="ru-RU" baseline="0" dirty="0"/>
-                        <a:t>Ещё причина выбрать такое поведение: ошибки отложенного</a:t>
-                      </a:r>
-                      <a:r>
-                        <a:rPr lang="en-US" baseline="0" dirty="0"/>
-                        <a:t> </a:t>
-                      </a:r>
-                      <a:r>
-                        <a:rPr lang="en-US" baseline="0" dirty="0" err="1"/>
-                        <a:t>writeback</a:t>
-                      </a:r>
-                      <a:r>
-                        <a:rPr lang="en-US" baseline="0"/>
-                        <a:t>.</a:t>
-                      </a:r>
-                      <a:endParaRPr lang="ru-RU" dirty="0"/>
+                      <a:endParaRPr lang="en-US" baseline="0" dirty="0"/>
                     </a:p>
                   </a:txBody>
                   <a:tcPr/>
@@ -19570,33 +19927,6 @@
                 <a:extLst>
                   <a:ext uri="{0D108BD9-81ED-4DB2-BD59-A6C34878D82A}">
                     <a16:rowId xmlns:a16="http://schemas.microsoft.com/office/drawing/2014/main" val="10003"/>
-                  </a:ext>
-                </a:extLst>
-              </a:tr>
-              <a:tr h="0">
-                <a:tc>
-                  <a:txBody>
-                    <a:bodyPr/>
-                    <a:lstStyle/>
-                    <a:p>
-                      <a:pPr marL="0" indent="0">
-                        <a:buFont typeface="Arial" panose="020B0604020202020204" pitchFamily="34" charset="0"/>
-                        <a:buNone/>
-                      </a:pPr>
-                      <a:r>
-                        <a:rPr lang="en-US" dirty="0">
-                          <a:hlinkClick r:id="rId3"/>
-                        </a:rPr>
-                        <a:t>https://lwn.net/Articles/457667/</a:t>
-                      </a:r>
-                      <a:endParaRPr lang="ru-RU" dirty="0"/>
-                    </a:p>
-                  </a:txBody>
-                  <a:tcPr/>
-                </a:tc>
-                <a:extLst>
-                  <a:ext uri="{0D108BD9-81ED-4DB2-BD59-A6C34878D82A}">
-                    <a16:rowId xmlns:a16="http://schemas.microsoft.com/office/drawing/2014/main" val="10004"/>
                   </a:ext>
                 </a:extLst>
               </a:tr>
@@ -19607,7 +19937,7 @@
     </p:spTree>
     <p:extLst>
       <p:ext uri="{BB962C8B-B14F-4D97-AF65-F5344CB8AC3E}">
-        <p14:creationId xmlns:p14="http://schemas.microsoft.com/office/powerpoint/2010/main" val="2804016396"/>
+        <p14:creationId xmlns:p14="http://schemas.microsoft.com/office/powerpoint/2010/main" val="3303937950"/>
       </p:ext>
     </p:extLst>
   </p:cSld>
@@ -19766,6 +20096,465 @@
           <p:nvPr>
             <p:extLst>
               <p:ext uri="{D42A27DB-BD31-4B8C-83A1-F6EECF244321}">
+                <p14:modId xmlns:p14="http://schemas.microsoft.com/office/powerpoint/2010/main" val="413958782"/>
+              </p:ext>
+            </p:extLst>
+          </p:nvPr>
+        </p:nvGraphicFramePr>
+        <p:xfrm>
+          <a:off x="0" y="365762"/>
+          <a:ext cx="12192000" cy="4663440"/>
+        </p:xfrm>
+        <a:graphic>
+          <a:graphicData uri="http://schemas.openxmlformats.org/drawingml/2006/table">
+            <a:tbl>
+              <a:tblPr firstRow="1" bandRow="1">
+                <a:tableStyleId>{3B4B98B0-60AC-42C2-AFA5-B58CD77FA1E5}</a:tableStyleId>
+              </a:tblPr>
+              <a:tblGrid>
+                <a:gridCol w="12192000">
+                  <a:extLst>
+                    <a:ext uri="{9D8B030D-6E8A-4147-A177-3AD203B41FA5}">
+                      <a16:colId xmlns:a16="http://schemas.microsoft.com/office/drawing/2014/main" val="20000"/>
+                    </a:ext>
+                  </a:extLst>
+                </a:gridCol>
+              </a:tblGrid>
+              <a:tr h="0">
+                <a:tc>
+                  <a:txBody>
+                    <a:bodyPr/>
+                    <a:lstStyle/>
+                    <a:p>
+                      <a:r>
+                        <a:rPr lang="ru-RU" sz="2400" dirty="0"/>
+                        <a:t>Что журналировать? </a:t>
+                      </a:r>
+                      <a:r>
+                        <a:rPr lang="en-US" sz="2400" dirty="0"/>
+                        <a:t>Consistent FS state.</a:t>
+                      </a:r>
+                      <a:endParaRPr lang="ru-RU" sz="2400" dirty="0"/>
+                    </a:p>
+                  </a:txBody>
+                  <a:tcPr/>
+                </a:tc>
+                <a:extLst>
+                  <a:ext uri="{0D108BD9-81ED-4DB2-BD59-A6C34878D82A}">
+                    <a16:rowId xmlns:a16="http://schemas.microsoft.com/office/drawing/2014/main" val="10000"/>
+                  </a:ext>
+                </a:extLst>
+              </a:tr>
+              <a:tr h="0">
+                <a:tc>
+                  <a:txBody>
+                    <a:bodyPr/>
+                    <a:lstStyle/>
+                    <a:p>
+                      <a:r>
+                        <a:rPr lang="ru-RU" dirty="0"/>
+                        <a:t>Рассмотрим пример добавления данных в конец файла на </a:t>
+                      </a:r>
+                      <a:r>
+                        <a:rPr lang="en-US" dirty="0"/>
+                        <a:t>XFS.</a:t>
+                      </a:r>
+                      <a:endParaRPr lang="ru-RU" dirty="0"/>
+                    </a:p>
+                  </a:txBody>
+                  <a:tcPr/>
+                </a:tc>
+                <a:extLst>
+                  <a:ext uri="{0D108BD9-81ED-4DB2-BD59-A6C34878D82A}">
+                    <a16:rowId xmlns:a16="http://schemas.microsoft.com/office/drawing/2014/main" val="10001"/>
+                  </a:ext>
+                </a:extLst>
+              </a:tr>
+              <a:tr h="0">
+                <a:tc>
+                  <a:txBody>
+                    <a:bodyPr/>
+                    <a:lstStyle/>
+                    <a:p>
+                      <a:r>
+                        <a:rPr lang="en-US" dirty="0"/>
+                        <a:t>XFS</a:t>
+                      </a:r>
+                    </a:p>
+                    <a:p>
+                      <a:pPr marL="285750" indent="-285750">
+                        <a:buFont typeface="Arial" panose="020B0604020202020204" pitchFamily="34" charset="0"/>
+                        <a:buChar char="•"/>
+                      </a:pPr>
+                      <a:r>
+                        <a:rPr lang="ru-RU" dirty="0"/>
+                        <a:t>Найдёт свободные нулевые блоки,</a:t>
+                      </a:r>
+                    </a:p>
+                    <a:p>
+                      <a:pPr marL="285750" indent="-285750">
+                        <a:buFont typeface="Arial" panose="020B0604020202020204" pitchFamily="34" charset="0"/>
+                        <a:buChar char="•"/>
+                      </a:pPr>
+                      <a:r>
+                        <a:rPr lang="ru-RU" dirty="0"/>
+                        <a:t>Зажурналирует обновление </a:t>
+                      </a:r>
+                      <a:r>
+                        <a:rPr lang="en-US" dirty="0"/>
+                        <a:t>block bitmap</a:t>
+                      </a:r>
+                      <a:r>
+                        <a:rPr lang="ru-RU" dirty="0"/>
+                        <a:t>, </a:t>
+                      </a:r>
+                      <a:r>
+                        <a:rPr lang="en-US" dirty="0" err="1"/>
+                        <a:t>inode</a:t>
+                      </a:r>
+                      <a:r>
+                        <a:rPr lang="en-US" dirty="0"/>
+                        <a:t>,</a:t>
+                      </a:r>
+                      <a:r>
+                        <a:rPr lang="ru-RU" dirty="0"/>
+                        <a:t> и </a:t>
+                      </a:r>
+                      <a:r>
+                        <a:rPr lang="en-US" dirty="0"/>
+                        <a:t>extent</a:t>
+                      </a:r>
+                      <a:r>
+                        <a:rPr lang="en-US" baseline="0" dirty="0"/>
+                        <a:t> tree,</a:t>
+                      </a:r>
+                      <a:endParaRPr lang="en-US" dirty="0"/>
+                    </a:p>
+                    <a:p>
+                      <a:pPr marL="285750" indent="-285750">
+                        <a:buFont typeface="Arial" panose="020B0604020202020204" pitchFamily="34" charset="0"/>
+                        <a:buChar char="•"/>
+                      </a:pPr>
+                      <a:r>
+                        <a:rPr lang="ru-RU" dirty="0"/>
+                        <a:t>Даст</a:t>
+                      </a:r>
+                      <a:r>
+                        <a:rPr lang="ru-RU" baseline="0" dirty="0"/>
+                        <a:t> пользовательскому приложению писать в выделенные блоки.</a:t>
+                      </a:r>
+                    </a:p>
+                    <a:p>
+                      <a:pPr marL="285750" indent="-285750">
+                        <a:buFont typeface="Arial" panose="020B0604020202020204" pitchFamily="34" charset="0"/>
+                        <a:buChar char="•"/>
+                      </a:pPr>
+                      <a:endParaRPr lang="ru-RU" baseline="0" dirty="0"/>
+                    </a:p>
+                    <a:p>
+                      <a:pPr marL="0" indent="0">
+                        <a:buFont typeface="Arial" panose="020B0604020202020204" pitchFamily="34" charset="0"/>
+                        <a:buNone/>
+                      </a:pPr>
+                      <a:r>
+                        <a:rPr lang="ru-RU" baseline="0" dirty="0"/>
+                        <a:t>В журнал попадут только изменения метаданных ФС (килобайты). Запись же пользовательских данных (потенциально – гигабайты) пойдёт мимо журнала.</a:t>
+                      </a:r>
+                    </a:p>
+                    <a:p>
+                      <a:pPr marL="0" indent="0">
+                        <a:buFont typeface="Arial" panose="020B0604020202020204" pitchFamily="34" charset="0"/>
+                        <a:buNone/>
+                      </a:pPr>
+                      <a:endParaRPr lang="ru-RU" baseline="0" dirty="0"/>
+                    </a:p>
+                    <a:p>
+                      <a:pPr marL="0" indent="0">
+                        <a:buFont typeface="Arial" panose="020B0604020202020204" pitchFamily="34" charset="0"/>
+                        <a:buNone/>
+                      </a:pPr>
+                      <a:r>
+                        <a:rPr lang="ru-RU" baseline="0" dirty="0"/>
+                        <a:t>Что произойдёт при падении ОС во время такой записи в файл?</a:t>
+                      </a:r>
+                      <a:endParaRPr lang="ru-RU" dirty="0"/>
+                    </a:p>
+                  </a:txBody>
+                  <a:tcPr/>
+                </a:tc>
+                <a:extLst>
+                  <a:ext uri="{0D108BD9-81ED-4DB2-BD59-A6C34878D82A}">
+                    <a16:rowId xmlns:a16="http://schemas.microsoft.com/office/drawing/2014/main" val="10002"/>
+                  </a:ext>
+                </a:extLst>
+              </a:tr>
+              <a:tr h="0">
+                <a:tc>
+                  <a:txBody>
+                    <a:bodyPr/>
+                    <a:lstStyle/>
+                    <a:p>
+                      <a:pPr marL="0" indent="0">
+                        <a:buFont typeface="Arial" panose="020B0604020202020204" pitchFamily="34" charset="0"/>
+                        <a:buNone/>
+                      </a:pPr>
+                      <a:r>
+                        <a:rPr lang="ru-RU" dirty="0"/>
+                        <a:t>Получится подросший</a:t>
+                      </a:r>
+                      <a:r>
+                        <a:rPr lang="ru-RU" baseline="0" dirty="0"/>
+                        <a:t> в размере файл, в хвосте которого будет мусор.</a:t>
+                      </a:r>
+                    </a:p>
+                    <a:p>
+                      <a:pPr marL="0" indent="0">
+                        <a:buFont typeface="Arial" panose="020B0604020202020204" pitchFamily="34" charset="0"/>
+                        <a:buNone/>
+                      </a:pPr>
+                      <a:endParaRPr lang="ru-RU" baseline="0" dirty="0"/>
+                    </a:p>
+                    <a:p>
+                      <a:pPr marL="0" indent="0">
+                        <a:buFont typeface="Arial" panose="020B0604020202020204" pitchFamily="34" charset="0"/>
+                        <a:buNone/>
+                      </a:pPr>
+                      <a:r>
+                        <a:rPr lang="ru-RU" baseline="0" dirty="0" smtClean="0"/>
+                        <a:t>Ещё одна причина для пользовательского приложения делать </a:t>
+                      </a:r>
+                      <a:r>
+                        <a:rPr lang="en-US" baseline="0" dirty="0" err="1" smtClean="0"/>
+                        <a:t>fsync</a:t>
+                      </a:r>
+                      <a:r>
+                        <a:rPr lang="en-US" baseline="0" dirty="0" smtClean="0"/>
+                        <a:t>() -</a:t>
+                      </a:r>
+                      <a:r>
+                        <a:rPr lang="ru-RU" baseline="0" dirty="0" smtClean="0"/>
+                        <a:t> </a:t>
+                      </a:r>
+                      <a:r>
+                        <a:rPr lang="ru-RU" baseline="0" dirty="0"/>
+                        <a:t>ошибки отложенного</a:t>
+                      </a:r>
+                      <a:r>
+                        <a:rPr lang="en-US" baseline="0" dirty="0"/>
+                        <a:t> </a:t>
+                      </a:r>
+                      <a:r>
+                        <a:rPr lang="en-US" baseline="0" dirty="0" err="1"/>
+                        <a:t>writeback</a:t>
+                      </a:r>
+                      <a:r>
+                        <a:rPr lang="en-US" baseline="0" dirty="0"/>
+                        <a:t>.</a:t>
+                      </a:r>
+                      <a:endParaRPr lang="ru-RU" dirty="0"/>
+                    </a:p>
+                  </a:txBody>
+                  <a:tcPr/>
+                </a:tc>
+                <a:extLst>
+                  <a:ext uri="{0D108BD9-81ED-4DB2-BD59-A6C34878D82A}">
+                    <a16:rowId xmlns:a16="http://schemas.microsoft.com/office/drawing/2014/main" val="10003"/>
+                  </a:ext>
+                </a:extLst>
+              </a:tr>
+              <a:tr h="0">
+                <a:tc>
+                  <a:txBody>
+                    <a:bodyPr/>
+                    <a:lstStyle/>
+                    <a:p>
+                      <a:pPr marL="0" indent="0">
+                        <a:buFont typeface="Arial" panose="020B0604020202020204" pitchFamily="34" charset="0"/>
+                        <a:buNone/>
+                      </a:pPr>
+                      <a:r>
+                        <a:rPr lang="en-US" dirty="0">
+                          <a:hlinkClick r:id="rId3"/>
+                        </a:rPr>
+                        <a:t>https://lwn.net/Articles/457667/</a:t>
+                      </a:r>
+                      <a:endParaRPr lang="ru-RU" dirty="0"/>
+                    </a:p>
+                  </a:txBody>
+                  <a:tcPr/>
+                </a:tc>
+                <a:extLst>
+                  <a:ext uri="{0D108BD9-81ED-4DB2-BD59-A6C34878D82A}">
+                    <a16:rowId xmlns:a16="http://schemas.microsoft.com/office/drawing/2014/main" val="10004"/>
+                  </a:ext>
+                </a:extLst>
+              </a:tr>
+            </a:tbl>
+          </a:graphicData>
+        </a:graphic>
+      </p:graphicFrame>
+    </p:spTree>
+    <p:extLst>
+      <p:ext uri="{BB962C8B-B14F-4D97-AF65-F5344CB8AC3E}">
+        <p14:creationId xmlns:p14="http://schemas.microsoft.com/office/powerpoint/2010/main" val="2804016396"/>
+      </p:ext>
+    </p:extLst>
+  </p:cSld>
+  <p:clrMapOvr>
+    <a:masterClrMapping/>
+  </p:clrMapOvr>
+</p:sld>
+</file>
+
+<file path=ppt/slides/slide26.xml><?xml version="1.0" encoding="utf-8"?>
+<p:sld xmlns:a="http://schemas.openxmlformats.org/drawingml/2006/main" xmlns:r="http://schemas.openxmlformats.org/officeDocument/2006/relationships" xmlns:p="http://schemas.openxmlformats.org/presentationml/2006/main">
+  <p:cSld>
+    <p:spTree>
+      <p:nvGrpSpPr>
+        <p:cNvPr id="1" name=""/>
+        <p:cNvGrpSpPr/>
+        <p:nvPr/>
+      </p:nvGrpSpPr>
+      <p:grpSpPr>
+        <a:xfrm>
+          <a:off x="0" y="0"/>
+          <a:ext cx="0" cy="0"/>
+          <a:chOff x="0" y="0"/>
+          <a:chExt cx="0" cy="0"/>
+        </a:xfrm>
+      </p:grpSpPr>
+      <p:graphicFrame>
+        <p:nvGraphicFramePr>
+          <p:cNvPr id="5" name="Table 4"/>
+          <p:cNvGraphicFramePr>
+            <a:graphicFrameLocks noGrp="1"/>
+          </p:cNvGraphicFramePr>
+          <p:nvPr>
+            <p:extLst>
+              <p:ext uri="{D42A27DB-BD31-4B8C-83A1-F6EECF244321}">
+                <p14:modId xmlns:p14="http://schemas.microsoft.com/office/powerpoint/2010/main" val="2281224332"/>
+              </p:ext>
+            </p:extLst>
+          </p:nvPr>
+        </p:nvGraphicFramePr>
+        <p:xfrm>
+          <a:off x="0" y="1"/>
+          <a:ext cx="12192000" cy="365760"/>
+        </p:xfrm>
+        <a:graphic>
+          <a:graphicData uri="http://schemas.openxmlformats.org/drawingml/2006/table">
+            <a:tbl>
+              <a:tblPr firstRow="1" bandRow="1">
+                <a:tableStyleId>{5C22544A-7EE6-4342-B048-85BDC9FD1C3A}</a:tableStyleId>
+              </a:tblPr>
+              <a:tblGrid>
+                <a:gridCol w="12192000">
+                  <a:extLst>
+                    <a:ext uri="{9D8B030D-6E8A-4147-A177-3AD203B41FA5}">
+                      <a16:colId xmlns:a16="http://schemas.microsoft.com/office/drawing/2014/main" val="20000"/>
+                    </a:ext>
+                  </a:extLst>
+                </a:gridCol>
+              </a:tblGrid>
+              <a:tr h="321276">
+                <a:tc>
+                  <a:txBody>
+                    <a:bodyPr/>
+                    <a:lstStyle/>
+                    <a:p>
+                      <a:r>
+                        <a:rPr lang="ru-RU" dirty="0"/>
+                        <a:t>Основы</a:t>
+                      </a:r>
+                      <a:r>
+                        <a:rPr lang="ru-RU" baseline="0" dirty="0"/>
+                        <a:t> построения файловых систем</a:t>
+                      </a:r>
+                      <a:endParaRPr lang="ru-RU" dirty="0"/>
+                    </a:p>
+                  </a:txBody>
+                  <a:tcPr/>
+                </a:tc>
+                <a:extLst>
+                  <a:ext uri="{0D108BD9-81ED-4DB2-BD59-A6C34878D82A}">
+                    <a16:rowId xmlns:a16="http://schemas.microsoft.com/office/drawing/2014/main" val="10000"/>
+                  </a:ext>
+                </a:extLst>
+              </a:tr>
+            </a:tbl>
+          </a:graphicData>
+        </a:graphic>
+      </p:graphicFrame>
+      <p:graphicFrame>
+        <p:nvGraphicFramePr>
+          <p:cNvPr id="6" name="Table 5"/>
+          <p:cNvGraphicFramePr>
+            <a:graphicFrameLocks noGrp="1"/>
+          </p:cNvGraphicFramePr>
+          <p:nvPr>
+            <p:extLst>
+              <p:ext uri="{D42A27DB-BD31-4B8C-83A1-F6EECF244321}">
+                <p14:modId xmlns:p14="http://schemas.microsoft.com/office/powerpoint/2010/main" val="4164474727"/>
+              </p:ext>
+            </p:extLst>
+          </p:nvPr>
+        </p:nvGraphicFramePr>
+        <p:xfrm>
+          <a:off x="0" y="6532604"/>
+          <a:ext cx="12192000" cy="365760"/>
+        </p:xfrm>
+        <a:graphic>
+          <a:graphicData uri="http://schemas.openxmlformats.org/drawingml/2006/table">
+            <a:tbl>
+              <a:tblPr firstRow="1" bandRow="1">
+                <a:tableStyleId>{5C22544A-7EE6-4342-B048-85BDC9FD1C3A}</a:tableStyleId>
+              </a:tblPr>
+              <a:tblGrid>
+                <a:gridCol w="12192000">
+                  <a:extLst>
+                    <a:ext uri="{9D8B030D-6E8A-4147-A177-3AD203B41FA5}">
+                      <a16:colId xmlns:a16="http://schemas.microsoft.com/office/drawing/2014/main" val="20000"/>
+                    </a:ext>
+                  </a:extLst>
+                </a:gridCol>
+              </a:tblGrid>
+              <a:tr h="308094">
+                <a:tc>
+                  <a:txBody>
+                    <a:bodyPr/>
+                    <a:lstStyle/>
+                    <a:p>
+                      <a:r>
+                        <a:rPr lang="en-US" dirty="0"/>
+                        <a:t>Acronis @ </a:t>
+                      </a:r>
+                      <a:r>
+                        <a:rPr lang="ru-RU" dirty="0"/>
+                        <a:t>МФТИ</a:t>
+                      </a:r>
+                    </a:p>
+                  </a:txBody>
+                  <a:tcPr/>
+                </a:tc>
+                <a:extLst>
+                  <a:ext uri="{0D108BD9-81ED-4DB2-BD59-A6C34878D82A}">
+                    <a16:rowId xmlns:a16="http://schemas.microsoft.com/office/drawing/2014/main" val="10000"/>
+                  </a:ext>
+                </a:extLst>
+              </a:tr>
+            </a:tbl>
+          </a:graphicData>
+        </a:graphic>
+      </p:graphicFrame>
+      <p:graphicFrame>
+        <p:nvGraphicFramePr>
+          <p:cNvPr id="2" name="Table 1"/>
+          <p:cNvGraphicFramePr>
+            <a:graphicFrameLocks noGrp="1"/>
+          </p:cNvGraphicFramePr>
+          <p:nvPr>
+            <p:extLst>
+              <p:ext uri="{D42A27DB-BD31-4B8C-83A1-F6EECF244321}">
                 <p14:modId xmlns:p14="http://schemas.microsoft.com/office/powerpoint/2010/main" val="462762173"/>
               </p:ext>
             </p:extLst>
@@ -19925,7 +20714,7 @@
 </p:sld>
 </file>
 
-<file path=ppt/slides/slide26.xml><?xml version="1.0" encoding="utf-8"?>
+<file path=ppt/slides/slide27.xml><?xml version="1.0" encoding="utf-8"?>
 <p:sld xmlns:a="http://schemas.openxmlformats.org/drawingml/2006/main" xmlns:r="http://schemas.openxmlformats.org/officeDocument/2006/relationships" xmlns:p="http://schemas.openxmlformats.org/presentationml/2006/main">
   <p:cSld>
     <p:spTree>
@@ -20708,7 +21497,7 @@
 </p:sld>
 </file>
 
-<file path=ppt/slides/slide27.xml><?xml version="1.0" encoding="utf-8"?>
+<file path=ppt/slides/slide28.xml><?xml version="1.0" encoding="utf-8"?>
 <p:sld xmlns:a="http://schemas.openxmlformats.org/drawingml/2006/main" xmlns:r="http://schemas.openxmlformats.org/officeDocument/2006/relationships" xmlns:p="http://schemas.openxmlformats.org/presentationml/2006/main">
   <p:cSld>
     <p:spTree>
@@ -21102,6 +21891,10 @@
                       <a:br>
                         <a:rPr lang="en-US" baseline="0" dirty="0"/>
                       </a:br>
+                      <a:r>
+                        <a:rPr lang="en-US" baseline="0" dirty="0"/>
+                        <a:t/>
+                      </a:r>
                       <a:br>
                         <a:rPr lang="en-US" baseline="0" dirty="0"/>
                       </a:br>
@@ -21688,7 +22481,7 @@
 </p:sld>
 </file>
 
-<file path=ppt/slides/slide28.xml><?xml version="1.0" encoding="utf-8"?>
+<file path=ppt/slides/slide29.xml><?xml version="1.0" encoding="utf-8"?>
 <p:sld xmlns:a="http://schemas.openxmlformats.org/drawingml/2006/main" xmlns:r="http://schemas.openxmlformats.org/officeDocument/2006/relationships" xmlns:p="http://schemas.openxmlformats.org/presentationml/2006/main">
   <p:cSld>
     <p:spTree>
@@ -22021,435 +22814,6 @@
     <p:extLst>
       <p:ext uri="{BB962C8B-B14F-4D97-AF65-F5344CB8AC3E}">
         <p14:creationId xmlns:p14="http://schemas.microsoft.com/office/powerpoint/2010/main" val="1449937016"/>
-      </p:ext>
-    </p:extLst>
-  </p:cSld>
-  <p:clrMapOvr>
-    <a:masterClrMapping/>
-  </p:clrMapOvr>
-</p:sld>
-</file>
-
-<file path=ppt/slides/slide29.xml><?xml version="1.0" encoding="utf-8"?>
-<p:sld xmlns:a="http://schemas.openxmlformats.org/drawingml/2006/main" xmlns:r="http://schemas.openxmlformats.org/officeDocument/2006/relationships" xmlns:p="http://schemas.openxmlformats.org/presentationml/2006/main">
-  <p:cSld>
-    <p:spTree>
-      <p:nvGrpSpPr>
-        <p:cNvPr id="1" name=""/>
-        <p:cNvGrpSpPr/>
-        <p:nvPr/>
-      </p:nvGrpSpPr>
-      <p:grpSpPr>
-        <a:xfrm>
-          <a:off x="0" y="0"/>
-          <a:ext cx="0" cy="0"/>
-          <a:chOff x="0" y="0"/>
-          <a:chExt cx="0" cy="0"/>
-        </a:xfrm>
-      </p:grpSpPr>
-      <p:graphicFrame>
-        <p:nvGraphicFramePr>
-          <p:cNvPr id="5" name="Table 4"/>
-          <p:cNvGraphicFramePr>
-            <a:graphicFrameLocks noGrp="1"/>
-          </p:cNvGraphicFramePr>
-          <p:nvPr>
-            <p:extLst/>
-          </p:nvPr>
-        </p:nvGraphicFramePr>
-        <p:xfrm>
-          <a:off x="0" y="1"/>
-          <a:ext cx="12192000" cy="365760"/>
-        </p:xfrm>
-        <a:graphic>
-          <a:graphicData uri="http://schemas.openxmlformats.org/drawingml/2006/table">
-            <a:tbl>
-              <a:tblPr firstRow="1" bandRow="1">
-                <a:tableStyleId>{5C22544A-7EE6-4342-B048-85BDC9FD1C3A}</a:tableStyleId>
-              </a:tblPr>
-              <a:tblGrid>
-                <a:gridCol w="12192000">
-                  <a:extLst>
-                    <a:ext uri="{9D8B030D-6E8A-4147-A177-3AD203B41FA5}">
-                      <a16:colId xmlns:a16="http://schemas.microsoft.com/office/drawing/2014/main" val="20000"/>
-                    </a:ext>
-                  </a:extLst>
-                </a:gridCol>
-              </a:tblGrid>
-              <a:tr h="321276">
-                <a:tc>
-                  <a:txBody>
-                    <a:bodyPr/>
-                    <a:lstStyle/>
-                    <a:p>
-                      <a:r>
-                        <a:rPr lang="ru-RU" dirty="0"/>
-                        <a:t>Основы</a:t>
-                      </a:r>
-                      <a:r>
-                        <a:rPr lang="ru-RU" baseline="0" dirty="0"/>
-                        <a:t> построения файловых систем</a:t>
-                      </a:r>
-                      <a:endParaRPr lang="ru-RU" dirty="0"/>
-                    </a:p>
-                  </a:txBody>
-                  <a:tcPr/>
-                </a:tc>
-                <a:extLst>
-                  <a:ext uri="{0D108BD9-81ED-4DB2-BD59-A6C34878D82A}">
-                    <a16:rowId xmlns:a16="http://schemas.microsoft.com/office/drawing/2014/main" val="10000"/>
-                  </a:ext>
-                </a:extLst>
-              </a:tr>
-            </a:tbl>
-          </a:graphicData>
-        </a:graphic>
-      </p:graphicFrame>
-      <p:graphicFrame>
-        <p:nvGraphicFramePr>
-          <p:cNvPr id="6" name="Table 5"/>
-          <p:cNvGraphicFramePr>
-            <a:graphicFrameLocks noGrp="1"/>
-          </p:cNvGraphicFramePr>
-          <p:nvPr>
-            <p:extLst/>
-          </p:nvPr>
-        </p:nvGraphicFramePr>
-        <p:xfrm>
-          <a:off x="0" y="6532604"/>
-          <a:ext cx="12192000" cy="365760"/>
-        </p:xfrm>
-        <a:graphic>
-          <a:graphicData uri="http://schemas.openxmlformats.org/drawingml/2006/table">
-            <a:tbl>
-              <a:tblPr firstRow="1" bandRow="1">
-                <a:tableStyleId>{5C22544A-7EE6-4342-B048-85BDC9FD1C3A}</a:tableStyleId>
-              </a:tblPr>
-              <a:tblGrid>
-                <a:gridCol w="12192000">
-                  <a:extLst>
-                    <a:ext uri="{9D8B030D-6E8A-4147-A177-3AD203B41FA5}">
-                      <a16:colId xmlns:a16="http://schemas.microsoft.com/office/drawing/2014/main" val="20000"/>
-                    </a:ext>
-                  </a:extLst>
-                </a:gridCol>
-              </a:tblGrid>
-              <a:tr h="308094">
-                <a:tc>
-                  <a:txBody>
-                    <a:bodyPr/>
-                    <a:lstStyle/>
-                    <a:p>
-                      <a:r>
-                        <a:rPr lang="en-US" dirty="0"/>
-                        <a:t>Acronis @ </a:t>
-                      </a:r>
-                      <a:r>
-                        <a:rPr lang="ru-RU" dirty="0"/>
-                        <a:t>МФТИ</a:t>
-                      </a:r>
-                    </a:p>
-                  </a:txBody>
-                  <a:tcPr/>
-                </a:tc>
-                <a:extLst>
-                  <a:ext uri="{0D108BD9-81ED-4DB2-BD59-A6C34878D82A}">
-                    <a16:rowId xmlns:a16="http://schemas.microsoft.com/office/drawing/2014/main" val="10000"/>
-                  </a:ext>
-                </a:extLst>
-              </a:tr>
-            </a:tbl>
-          </a:graphicData>
-        </a:graphic>
-      </p:graphicFrame>
-      <p:graphicFrame>
-        <p:nvGraphicFramePr>
-          <p:cNvPr id="2" name="Table 1"/>
-          <p:cNvGraphicFramePr>
-            <a:graphicFrameLocks noGrp="1"/>
-          </p:cNvGraphicFramePr>
-          <p:nvPr>
-            <p:extLst>
-              <p:ext uri="{D42A27DB-BD31-4B8C-83A1-F6EECF244321}">
-                <p14:modId xmlns:p14="http://schemas.microsoft.com/office/powerpoint/2010/main" val="109808068"/>
-              </p:ext>
-            </p:extLst>
-          </p:nvPr>
-        </p:nvGraphicFramePr>
-        <p:xfrm>
-          <a:off x="0" y="365761"/>
-          <a:ext cx="12192000" cy="2560320"/>
-        </p:xfrm>
-        <a:graphic>
-          <a:graphicData uri="http://schemas.openxmlformats.org/drawingml/2006/table">
-            <a:tbl>
-              <a:tblPr firstRow="1" bandRow="1">
-                <a:tableStyleId>{3B4B98B0-60AC-42C2-AFA5-B58CD77FA1E5}</a:tableStyleId>
-              </a:tblPr>
-              <a:tblGrid>
-                <a:gridCol w="6096000">
-                  <a:extLst>
-                    <a:ext uri="{9D8B030D-6E8A-4147-A177-3AD203B41FA5}">
-                      <a16:colId xmlns:a16="http://schemas.microsoft.com/office/drawing/2014/main" val="20000"/>
-                    </a:ext>
-                  </a:extLst>
-                </a:gridCol>
-                <a:gridCol w="6096000">
-                  <a:extLst>
-                    <a:ext uri="{9D8B030D-6E8A-4147-A177-3AD203B41FA5}">
-                      <a16:colId xmlns:a16="http://schemas.microsoft.com/office/drawing/2014/main" val="20001"/>
-                    </a:ext>
-                  </a:extLst>
-                </a:gridCol>
-              </a:tblGrid>
-              <a:tr h="257445">
-                <a:tc gridSpan="2">
-                  <a:txBody>
-                    <a:bodyPr/>
-                    <a:lstStyle/>
-                    <a:p>
-                      <a:r>
-                        <a:rPr lang="ru-RU" sz="2400" dirty="0"/>
-                        <a:t>Что писать в журнал?</a:t>
-                      </a:r>
-                    </a:p>
-                  </a:txBody>
-                  <a:tcPr/>
-                </a:tc>
-                <a:tc hMerge="1">
-                  <a:txBody>
-                    <a:bodyPr/>
-                    <a:lstStyle/>
-                    <a:p>
-                      <a:endParaRPr lang="ru-RU"/>
-                    </a:p>
-                  </a:txBody>
-                  <a:tcPr/>
-                </a:tc>
-                <a:extLst>
-                  <a:ext uri="{0D108BD9-81ED-4DB2-BD59-A6C34878D82A}">
-                    <a16:rowId xmlns:a16="http://schemas.microsoft.com/office/drawing/2014/main" val="10000"/>
-                  </a:ext>
-                </a:extLst>
-              </a:tr>
-              <a:tr h="208816">
-                <a:tc>
-                  <a:txBody>
-                    <a:bodyPr/>
-                    <a:lstStyle/>
-                    <a:p>
-                      <a:r>
-                        <a:rPr lang="ru-RU" dirty="0"/>
-                        <a:t>Логические</a:t>
-                      </a:r>
-                      <a:r>
-                        <a:rPr lang="ru-RU" baseline="0" dirty="0"/>
-                        <a:t> изменения в ФС</a:t>
-                      </a:r>
-                      <a:r>
-                        <a:rPr lang="en-US" baseline="0" dirty="0"/>
-                        <a:t>:</a:t>
-                      </a:r>
-                    </a:p>
-                    <a:p>
-                      <a:pPr marL="285750" indent="-285750">
-                        <a:buFont typeface="Arial" panose="020B0604020202020204" pitchFamily="34" charset="0"/>
-                        <a:buChar char="•"/>
-                      </a:pPr>
-                      <a:r>
-                        <a:rPr lang="ru-RU" dirty="0"/>
-                        <a:t>Добавление</a:t>
-                      </a:r>
-                      <a:r>
-                        <a:rPr lang="en-US" dirty="0"/>
-                        <a:t>/</a:t>
-                      </a:r>
-                      <a:r>
-                        <a:rPr lang="ru-RU" dirty="0"/>
-                        <a:t>удаление</a:t>
-                      </a:r>
-                      <a:r>
-                        <a:rPr lang="en-US" dirty="0"/>
-                        <a:t>/</a:t>
-                      </a:r>
-                      <a:r>
-                        <a:rPr lang="ru-RU" dirty="0"/>
-                        <a:t>переименование файлов,</a:t>
-                      </a:r>
-                    </a:p>
-                    <a:p>
-                      <a:pPr marL="285750" indent="-285750">
-                        <a:buFont typeface="Arial" panose="020B0604020202020204" pitchFamily="34" charset="0"/>
-                        <a:buChar char="•"/>
-                      </a:pPr>
-                      <a:r>
-                        <a:rPr lang="ru-RU" dirty="0"/>
-                        <a:t>Изменение</a:t>
-                      </a:r>
-                      <a:r>
-                        <a:rPr lang="ru-RU" baseline="0" dirty="0"/>
-                        <a:t> размера файлов,</a:t>
-                      </a:r>
-                    </a:p>
-                    <a:p>
-                      <a:pPr marL="285750" indent="-285750">
-                        <a:buFont typeface="Arial" panose="020B0604020202020204" pitchFamily="34" charset="0"/>
-                        <a:buChar char="•"/>
-                      </a:pPr>
-                      <a:r>
-                        <a:rPr lang="ru-RU" baseline="0" dirty="0"/>
-                        <a:t>Изменение атрибутов,</a:t>
-                      </a:r>
-                    </a:p>
-                    <a:p>
-                      <a:pPr marL="285750" indent="-285750">
-                        <a:buFont typeface="Arial" panose="020B0604020202020204" pitchFamily="34" charset="0"/>
-                        <a:buChar char="•"/>
-                      </a:pPr>
-                      <a:r>
-                        <a:rPr lang="en-US" baseline="0" dirty="0"/>
-                        <a:t>…</a:t>
-                      </a:r>
-                      <a:endParaRPr lang="ru-RU" dirty="0"/>
-                    </a:p>
-                  </a:txBody>
-                  <a:tcPr/>
-                </a:tc>
-                <a:tc>
-                  <a:txBody>
-                    <a:bodyPr/>
-                    <a:lstStyle/>
-                    <a:p>
-                      <a:r>
-                        <a:rPr lang="ru-RU" dirty="0"/>
-                        <a:t>Физические изменения:</a:t>
-                      </a:r>
-                      <a:r>
-                        <a:rPr lang="ru-RU" baseline="0" dirty="0"/>
-                        <a:t> с</a:t>
-                      </a:r>
-                      <a:r>
-                        <a:rPr lang="ru-RU" dirty="0"/>
-                        <a:t>одержимое блоков</a:t>
-                      </a:r>
-                      <a:r>
-                        <a:rPr lang="ru-RU" baseline="0" dirty="0"/>
-                        <a:t> ФС, которое должно получиться после применения транзакции.</a:t>
-                      </a:r>
-                      <a:endParaRPr lang="ru-RU" dirty="0"/>
-                    </a:p>
-                  </a:txBody>
-                  <a:tcPr/>
-                </a:tc>
-                <a:extLst>
-                  <a:ext uri="{0D108BD9-81ED-4DB2-BD59-A6C34878D82A}">
-                    <a16:rowId xmlns:a16="http://schemas.microsoft.com/office/drawing/2014/main" val="10001"/>
-                  </a:ext>
-                </a:extLst>
-              </a:tr>
-              <a:tr h="208816">
-                <a:tc gridSpan="2">
-                  <a:txBody>
-                    <a:bodyPr/>
-                    <a:lstStyle/>
-                    <a:p>
-                      <a:pPr marL="0" indent="0">
-                        <a:buFont typeface="Arial" panose="020B0604020202020204" pitchFamily="34" charset="0"/>
-                        <a:buNone/>
-                      </a:pPr>
-                      <a:r>
-                        <a:rPr lang="ru-RU" dirty="0" err="1"/>
-                        <a:t>Журналирование</a:t>
-                      </a:r>
-                      <a:r>
-                        <a:rPr lang="ru-RU" dirty="0"/>
-                        <a:t> логических изменений имеет плюс: размер </a:t>
-                      </a:r>
-                      <a:r>
-                        <a:rPr lang="en-US" dirty="0" err="1"/>
-                        <a:t>inode</a:t>
-                      </a:r>
-                      <a:r>
-                        <a:rPr lang="en-US" dirty="0"/>
-                        <a:t> </a:t>
-                      </a:r>
-                      <a:r>
-                        <a:rPr lang="ru-RU" dirty="0"/>
-                        <a:t>в </a:t>
-                      </a:r>
-                      <a:r>
-                        <a:rPr lang="en-US" dirty="0"/>
-                        <a:t>ext4 </a:t>
-                      </a:r>
-                      <a:r>
-                        <a:rPr lang="ru-RU" dirty="0"/>
-                        <a:t>равен </a:t>
-                      </a:r>
-                      <a:r>
-                        <a:rPr lang="en-US" dirty="0"/>
-                        <a:t>256b, </a:t>
-                      </a:r>
-                      <a:r>
-                        <a:rPr lang="ru-RU" dirty="0"/>
-                        <a:t>а если </a:t>
-                      </a:r>
-                      <a:r>
-                        <a:rPr lang="ru-RU" dirty="0" err="1"/>
-                        <a:t>журналировать</a:t>
-                      </a:r>
-                      <a:r>
-                        <a:rPr lang="ru-RU" dirty="0"/>
-                        <a:t> изменения </a:t>
-                      </a:r>
-                      <a:r>
-                        <a:rPr lang="ru-RU" b="1" dirty="0"/>
-                        <a:t>блоков</a:t>
-                      </a:r>
-                      <a:r>
-                        <a:rPr lang="ru-RU" dirty="0"/>
-                        <a:t>, то минимальная запись в журнале займёт 8</a:t>
-                      </a:r>
-                      <a:r>
-                        <a:rPr lang="en-US" dirty="0"/>
-                        <a:t>k (</a:t>
-                      </a:r>
-                      <a:r>
-                        <a:rPr lang="ru-RU" dirty="0"/>
-                        <a:t>типичный размер блока)</a:t>
-                      </a:r>
-                      <a:r>
-                        <a:rPr lang="en-US" dirty="0"/>
-                        <a:t>.</a:t>
-                      </a:r>
-                      <a:endParaRPr lang="ru-RU" dirty="0"/>
-                    </a:p>
-                  </a:txBody>
-                  <a:tcPr/>
-                </a:tc>
-                <a:tc hMerge="1">
-                  <a:txBody>
-                    <a:bodyPr/>
-                    <a:lstStyle/>
-                    <a:p>
-                      <a:endParaRPr lang="ru-RU" dirty="0"/>
-                    </a:p>
-                  </a:txBody>
-                  <a:tcPr/>
-                </a:tc>
-                <a:extLst>
-                  <a:ext uri="{0D108BD9-81ED-4DB2-BD59-A6C34878D82A}">
-                    <a16:rowId xmlns:a16="http://schemas.microsoft.com/office/drawing/2014/main" val="3098670892"/>
-                  </a:ext>
-                </a:extLst>
-              </a:tr>
-            </a:tbl>
-          </a:graphicData>
-        </a:graphic>
-      </p:graphicFrame>
-    </p:spTree>
-    <p:extLst>
-      <p:ext uri="{BB962C8B-B14F-4D97-AF65-F5344CB8AC3E}">
-        <p14:creationId xmlns:p14="http://schemas.microsoft.com/office/powerpoint/2010/main" val="1728343115"/>
       </p:ext>
     </p:extLst>
   </p:cSld>
@@ -22757,11 +23121,7 @@
             <a:graphicFrameLocks noGrp="1"/>
           </p:cNvGraphicFramePr>
           <p:nvPr>
-            <p:extLst>
-              <p:ext uri="{D42A27DB-BD31-4B8C-83A1-F6EECF244321}">
-                <p14:modId xmlns:p14="http://schemas.microsoft.com/office/powerpoint/2010/main" val="2281224332"/>
-              </p:ext>
-            </p:extLst>
+            <p:extLst/>
           </p:nvPr>
         </p:nvGraphicFramePr>
         <p:xfrm>
@@ -22819,11 +23179,7 @@
             <a:graphicFrameLocks noGrp="1"/>
           </p:cNvGraphicFramePr>
           <p:nvPr>
-            <p:extLst>
-              <p:ext uri="{D42A27DB-BD31-4B8C-83A1-F6EECF244321}">
-                <p14:modId xmlns:p14="http://schemas.microsoft.com/office/powerpoint/2010/main" val="4164474727"/>
-              </p:ext>
-            </p:extLst>
+            <p:extLst/>
           </p:nvPr>
         </p:nvGraphicFramePr>
         <p:xfrm>
@@ -22882,14 +23238,14 @@
           <p:nvPr>
             <p:extLst>
               <p:ext uri="{D42A27DB-BD31-4B8C-83A1-F6EECF244321}">
-                <p14:modId xmlns:p14="http://schemas.microsoft.com/office/powerpoint/2010/main" val="3291876854"/>
+                <p14:modId xmlns:p14="http://schemas.microsoft.com/office/powerpoint/2010/main" val="319337116"/>
               </p:ext>
             </p:extLst>
           </p:nvPr>
         </p:nvGraphicFramePr>
         <p:xfrm>
           <a:off x="0" y="365761"/>
-          <a:ext cx="12192000" cy="2286000"/>
+          <a:ext cx="12192000" cy="2560320"/>
         </p:xfrm>
         <a:graphic>
           <a:graphicData uri="http://schemas.openxmlformats.org/drawingml/2006/table">
@@ -23069,12 +23425,72 @@
                         <a:buNone/>
                       </a:pPr>
                       <a:r>
+                        <a:rPr lang="ru-RU" dirty="0" err="1"/>
+                        <a:t>Журналирование</a:t>
+                      </a:r>
+                      <a:r>
                         <a:rPr lang="ru-RU" dirty="0"/>
-                        <a:t>Что</a:t>
-                      </a:r>
-                      <a:r>
-                        <a:rPr lang="ru-RU" baseline="0" dirty="0"/>
-                        <a:t> будет, если во время проигрывания журнала исчезнет питание и надо будет повторить проигрывание журнала?</a:t>
+                        <a:t> логических изменений имеет плюс: размер </a:t>
+                      </a:r>
+                      <a:r>
+                        <a:rPr lang="en-US" dirty="0" err="1"/>
+                        <a:t>inode</a:t>
+                      </a:r>
+                      <a:r>
+                        <a:rPr lang="en-US" dirty="0"/>
+                        <a:t> </a:t>
+                      </a:r>
+                      <a:r>
+                        <a:rPr lang="ru-RU" dirty="0"/>
+                        <a:t>в </a:t>
+                      </a:r>
+                      <a:r>
+                        <a:rPr lang="en-US" dirty="0"/>
+                        <a:t>ext4 </a:t>
+                      </a:r>
+                      <a:r>
+                        <a:rPr lang="ru-RU" dirty="0"/>
+                        <a:t>равен </a:t>
+                      </a:r>
+                      <a:r>
+                        <a:rPr lang="en-US" dirty="0"/>
+                        <a:t>256b, </a:t>
+                      </a:r>
+                      <a:r>
+                        <a:rPr lang="ru-RU" dirty="0"/>
+                        <a:t>а если </a:t>
+                      </a:r>
+                      <a:r>
+                        <a:rPr lang="ru-RU" dirty="0" err="1"/>
+                        <a:t>журналировать</a:t>
+                      </a:r>
+                      <a:r>
+                        <a:rPr lang="ru-RU" dirty="0"/>
+                        <a:t> изменения </a:t>
+                      </a:r>
+                      <a:r>
+                        <a:rPr lang="ru-RU" b="1" dirty="0"/>
+                        <a:t>блоков</a:t>
+                      </a:r>
+                      <a:r>
+                        <a:rPr lang="ru-RU" dirty="0"/>
+                        <a:t>, то минимальная запись в журнале займёт </a:t>
+                      </a:r>
+                      <a:r>
+                        <a:rPr lang="en-US" dirty="0" smtClean="0"/>
+                        <a:t>4k </a:t>
+                      </a:r>
+                      <a:r>
+                        <a:rPr lang="en-US" dirty="0"/>
+                        <a:t>(</a:t>
+                      </a:r>
+                      <a:r>
+                        <a:rPr lang="ru-RU" dirty="0"/>
+                        <a:t>типичный размер блока)</a:t>
+                      </a:r>
+                      <a:r>
+                        <a:rPr lang="en-US" dirty="0"/>
+                        <a:t>.</a:t>
                       </a:r>
                       <a:endParaRPr lang="ru-RU" dirty="0"/>
                     </a:p>
@@ -23093,7 +23509,7 @@
                 </a:tc>
                 <a:extLst>
                   <a:ext uri="{0D108BD9-81ED-4DB2-BD59-A6C34878D82A}">
-                    <a16:rowId xmlns:a16="http://schemas.microsoft.com/office/drawing/2014/main" val="10002"/>
+                    <a16:rowId xmlns:a16="http://schemas.microsoft.com/office/drawing/2014/main" val="3098670892"/>
                   </a:ext>
                 </a:extLst>
               </a:tr>
@@ -23104,7 +23520,7 @@
     </p:spTree>
     <p:extLst>
       <p:ext uri="{BB962C8B-B14F-4D97-AF65-F5344CB8AC3E}">
-        <p14:creationId xmlns:p14="http://schemas.microsoft.com/office/powerpoint/2010/main" val="113245222"/>
+        <p14:creationId xmlns:p14="http://schemas.microsoft.com/office/powerpoint/2010/main" val="1728343115"/>
       </p:ext>
     </p:extLst>
   </p:cSld>
@@ -23263,14 +23679,14 @@
           <p:nvPr>
             <p:extLst>
               <p:ext uri="{D42A27DB-BD31-4B8C-83A1-F6EECF244321}">
-                <p14:modId xmlns:p14="http://schemas.microsoft.com/office/powerpoint/2010/main" val="4263390422"/>
+                <p14:modId xmlns:p14="http://schemas.microsoft.com/office/powerpoint/2010/main" val="3291876854"/>
               </p:ext>
             </p:extLst>
           </p:nvPr>
         </p:nvGraphicFramePr>
         <p:xfrm>
           <a:off x="0" y="365761"/>
-          <a:ext cx="12192000" cy="3200400"/>
+          <a:ext cx="12192000" cy="2286000"/>
         </p:xfrm>
         <a:graphic>
           <a:graphicData uri="http://schemas.openxmlformats.org/drawingml/2006/table">
@@ -23478,78 +23894,6 @@
                   </a:ext>
                 </a:extLst>
               </a:tr>
-              <a:tr h="208816">
-                <a:tc>
-                  <a:txBody>
-                    <a:bodyPr/>
-                    <a:lstStyle/>
-                    <a:p>
-                      <a:pPr marL="0" indent="0">
-                        <a:buFont typeface="Arial" panose="020B0604020202020204" pitchFamily="34" charset="0"/>
-                        <a:buNone/>
-                      </a:pPr>
-                      <a:r>
-                        <a:rPr lang="ru-RU" dirty="0"/>
-                        <a:t>Дважды проиграть</a:t>
-                      </a:r>
-                      <a:r>
-                        <a:rPr lang="ru-RU" baseline="0" dirty="0"/>
-                        <a:t> </a:t>
-                      </a:r>
-                      <a:r>
-                        <a:rPr lang="ru-RU" dirty="0"/>
-                        <a:t>транзакции в общем случае нельзя:</a:t>
-                      </a:r>
-                      <a:br>
-                        <a:rPr lang="ru-RU" dirty="0"/>
-                      </a:br>
-                      <a:r>
-                        <a:rPr lang="ru-RU" dirty="0"/>
-                        <a:t>как повторить </a:t>
-                      </a:r>
-                      <a:r>
-                        <a:rPr lang="en-US" dirty="0"/>
-                        <a:t>rename(“a”, “b”)?</a:t>
-                      </a:r>
-                      <a:endParaRPr lang="ru-RU" dirty="0"/>
-                    </a:p>
-                  </a:txBody>
-                  <a:tcPr/>
-                </a:tc>
-                <a:tc>
-                  <a:txBody>
-                    <a:bodyPr/>
-                    <a:lstStyle/>
-                    <a:p>
-                      <a:pPr marL="0" indent="0">
-                        <a:buFont typeface="Arial" panose="020B0604020202020204" pitchFamily="34" charset="0"/>
-                        <a:buNone/>
-                      </a:pPr>
-                      <a:endParaRPr lang="en-US" dirty="0"/>
-                    </a:p>
-                    <a:p>
-                      <a:pPr marL="0" indent="0">
-                        <a:buFont typeface="Arial" panose="020B0604020202020204" pitchFamily="34" charset="0"/>
-                        <a:buNone/>
-                      </a:pPr>
-                      <a:endParaRPr lang="en-US" dirty="0"/>
-                    </a:p>
-                    <a:p>
-                      <a:pPr marL="0" indent="0">
-                        <a:buFont typeface="Arial" panose="020B0604020202020204" pitchFamily="34" charset="0"/>
-                        <a:buNone/>
-                      </a:pPr>
-                      <a:endParaRPr lang="ru-RU" dirty="0"/>
-                    </a:p>
-                  </a:txBody>
-                  <a:tcPr/>
-                </a:tc>
-                <a:extLst>
-                  <a:ext uri="{0D108BD9-81ED-4DB2-BD59-A6C34878D82A}">
-                    <a16:rowId xmlns:a16="http://schemas.microsoft.com/office/drawing/2014/main" val="10003"/>
-                  </a:ext>
-                </a:extLst>
-              </a:tr>
             </a:tbl>
           </a:graphicData>
         </a:graphic>
@@ -23557,7 +23901,7 @@
     </p:spTree>
     <p:extLst>
       <p:ext uri="{BB962C8B-B14F-4D97-AF65-F5344CB8AC3E}">
-        <p14:creationId xmlns:p14="http://schemas.microsoft.com/office/powerpoint/2010/main" val="1422896934"/>
+        <p14:creationId xmlns:p14="http://schemas.microsoft.com/office/powerpoint/2010/main" val="113245222"/>
       </p:ext>
     </p:extLst>
   </p:cSld>
@@ -23716,7 +24060,7 @@
           <p:nvPr>
             <p:extLst>
               <p:ext uri="{D42A27DB-BD31-4B8C-83A1-F6EECF244321}">
-                <p14:modId xmlns:p14="http://schemas.microsoft.com/office/powerpoint/2010/main" val="587042650"/>
+                <p14:modId xmlns:p14="http://schemas.microsoft.com/office/powerpoint/2010/main" val="4263390422"/>
               </p:ext>
             </p:extLst>
           </p:nvPr>
@@ -23978,34 +24322,20 @@
                         <a:buFont typeface="Arial" panose="020B0604020202020204" pitchFamily="34" charset="0"/>
                         <a:buNone/>
                       </a:pPr>
-                      <a:r>
-                        <a:rPr lang="ru-RU" dirty="0"/>
-                        <a:t>Операции</a:t>
-                      </a:r>
-                      <a:r>
-                        <a:rPr lang="en-US" dirty="0"/>
-                        <a:t> “</a:t>
-                      </a:r>
-                      <a:r>
-                        <a:rPr lang="ru-RU" dirty="0"/>
-                        <a:t>записать такое-то содержимое поверх блока с номером </a:t>
-                      </a:r>
-                      <a:r>
-                        <a:rPr lang="en-US" dirty="0"/>
-                        <a:t>N”</a:t>
-                      </a:r>
-                      <a:r>
-                        <a:rPr lang="ru-RU" baseline="0" dirty="0"/>
-                        <a:t> </a:t>
-                      </a:r>
-                      <a:r>
-                        <a:rPr lang="ru-RU" b="1" baseline="0" dirty="0"/>
-                        <a:t>идемпотентны</a:t>
-                      </a:r>
-                      <a:r>
-                        <a:rPr lang="ru-RU" baseline="0" dirty="0"/>
-                        <a:t>: их можно повторять много раз с тем же эффектом, который даёт однократное повторение.</a:t>
-                      </a:r>
+                      <a:endParaRPr lang="en-US" dirty="0"/>
+                    </a:p>
+                    <a:p>
+                      <a:pPr marL="0" indent="0">
+                        <a:buFont typeface="Arial" panose="020B0604020202020204" pitchFamily="34" charset="0"/>
+                        <a:buNone/>
+                      </a:pPr>
+                      <a:endParaRPr lang="en-US" dirty="0"/>
+                    </a:p>
+                    <a:p>
+                      <a:pPr marL="0" indent="0">
+                        <a:buFont typeface="Arial" panose="020B0604020202020204" pitchFamily="34" charset="0"/>
+                        <a:buNone/>
+                      </a:pPr>
                       <a:endParaRPr lang="ru-RU" dirty="0"/>
                     </a:p>
                   </a:txBody>
@@ -24024,7 +24354,7 @@
     </p:spTree>
     <p:extLst>
       <p:ext uri="{BB962C8B-B14F-4D97-AF65-F5344CB8AC3E}">
-        <p14:creationId xmlns:p14="http://schemas.microsoft.com/office/powerpoint/2010/main" val="4095414020"/>
+        <p14:creationId xmlns:p14="http://schemas.microsoft.com/office/powerpoint/2010/main" val="1422896934"/>
       </p:ext>
     </p:extLst>
   </p:cSld>
@@ -24183,14 +24513,14 @@
           <p:nvPr>
             <p:extLst>
               <p:ext uri="{D42A27DB-BD31-4B8C-83A1-F6EECF244321}">
-                <p14:modId xmlns:p14="http://schemas.microsoft.com/office/powerpoint/2010/main" val="1630619957"/>
+                <p14:modId xmlns:p14="http://schemas.microsoft.com/office/powerpoint/2010/main" val="587042650"/>
               </p:ext>
             </p:extLst>
           </p:nvPr>
         </p:nvGraphicFramePr>
         <p:xfrm>
           <a:off x="0" y="365761"/>
-          <a:ext cx="12192000" cy="5034280"/>
+          <a:ext cx="12192000" cy="3200400"/>
         </p:xfrm>
         <a:graphic>
           <a:graphicData uri="http://schemas.openxmlformats.org/drawingml/2006/table">
@@ -24199,33 +24529,41 @@
                 <a:tableStyleId>{3B4B98B0-60AC-42C2-AFA5-B58CD77FA1E5}</a:tableStyleId>
               </a:tblPr>
               <a:tblGrid>
-                <a:gridCol w="12192000">
+                <a:gridCol w="6096000">
                   <a:extLst>
                     <a:ext uri="{9D8B030D-6E8A-4147-A177-3AD203B41FA5}">
                       <a16:colId xmlns:a16="http://schemas.microsoft.com/office/drawing/2014/main" val="20000"/>
                     </a:ext>
                   </a:extLst>
                 </a:gridCol>
+                <a:gridCol w="6096000">
+                  <a:extLst>
+                    <a:ext uri="{9D8B030D-6E8A-4147-A177-3AD203B41FA5}">
+                      <a16:colId xmlns:a16="http://schemas.microsoft.com/office/drawing/2014/main" val="20001"/>
+                    </a:ext>
+                  </a:extLst>
+                </a:gridCol>
               </a:tblGrid>
-              <a:tr h="370840">
-                <a:tc>
-                  <a:txBody>
-                    <a:bodyPr/>
-                    <a:lstStyle/>
-                    <a:p>
-                      <a:r>
-                        <a:rPr lang="en-US" sz="2400" dirty="0"/>
-                        <a:t>Case study: </a:t>
-                      </a:r>
+              <a:tr h="257445">
+                <a:tc gridSpan="2">
+                  <a:txBody>
+                    <a:bodyPr/>
+                    <a:lstStyle/>
+                    <a:p>
                       <a:r>
                         <a:rPr lang="ru-RU" sz="2400" dirty="0"/>
-                        <a:t>идемпотентность</a:t>
-                      </a:r>
-                      <a:r>
-                        <a:rPr lang="ru-RU" sz="2400" baseline="0" dirty="0"/>
-                        <a:t> операций</a:t>
-                      </a:r>
-                      <a:endParaRPr lang="en-US" sz="2400" dirty="0"/>
+                        <a:t>Что писать в журнал?</a:t>
+                      </a:r>
+                    </a:p>
+                  </a:txBody>
+                  <a:tcPr/>
+                </a:tc>
+                <a:tc hMerge="1">
+                  <a:txBody>
+                    <a:bodyPr/>
+                    <a:lstStyle/>
+                    <a:p>
+                      <a:endParaRPr lang="ru-RU"/>
                     </a:p>
                   </a:txBody>
                   <a:tcPr/>
@@ -24236,7 +24574,7 @@
                   </a:ext>
                 </a:extLst>
               </a:tr>
-              <a:tr h="370840">
+              <a:tr h="208816">
                 <a:tc>
                   <a:txBody>
                     <a:bodyPr/>
@@ -24244,289 +24582,103 @@
                     <a:p>
                       <a:r>
                         <a:rPr lang="ru-RU" dirty="0"/>
-                        <a:t>Рассмотрим протокол </a:t>
-                      </a:r>
-                      <a:r>
-                        <a:rPr lang="en-US" dirty="0"/>
-                        <a:t>Acronis </a:t>
-                      </a:r>
-                      <a:r>
-                        <a:rPr lang="ru-RU" dirty="0"/>
-                        <a:t>для общения со </a:t>
-                      </a:r>
-                      <a:r>
-                        <a:rPr lang="ru-RU" dirty="0" err="1"/>
-                        <a:t>стораджем</a:t>
-                      </a:r>
-                      <a:r>
-                        <a:rPr lang="ru-RU" dirty="0"/>
-                        <a:t> для </a:t>
-                      </a:r>
-                      <a:r>
-                        <a:rPr lang="ru-RU" dirty="0" err="1"/>
-                        <a:t>бекапов</a:t>
-                      </a:r>
-                      <a:r>
-                        <a:rPr lang="en-US" dirty="0"/>
+                        <a:t>Логические</a:t>
+                      </a:r>
+                      <a:r>
+                        <a:rPr lang="ru-RU" baseline="0" dirty="0"/>
+                        <a:t> изменения в ФС</a:t>
+                      </a:r>
+                      <a:r>
+                        <a:rPr lang="en-US" baseline="0" dirty="0"/>
                         <a:t>:</a:t>
                       </a:r>
                     </a:p>
                     <a:p>
-                      <a:endParaRPr lang="en-US" dirty="0"/>
-                    </a:p>
-                    <a:p>
                       <a:pPr marL="285750" indent="-285750">
-                        <a:buFont typeface="Arial" charset="0"/>
+                        <a:buFont typeface="Arial" panose="020B0604020202020204" pitchFamily="34" charset="0"/>
                         <a:buChar char="•"/>
                       </a:pPr>
                       <a:r>
+                        <a:rPr lang="ru-RU" dirty="0"/>
+                        <a:t>Добавление</a:t>
+                      </a:r>
+                      <a:r>
                         <a:rPr lang="en-US" dirty="0"/>
-                        <a:t>Open: </a:t>
-                      </a:r>
-                      <a:r>
-                        <a:rPr lang="en-US" dirty="0" err="1"/>
-                        <a:t>file_name</a:t>
+                        <a:t>/</a:t>
+                      </a:r>
+                      <a:r>
+                        <a:rPr lang="ru-RU" dirty="0"/>
+                        <a:t>удаление</a:t>
                       </a:r>
                       <a:r>
                         <a:rPr lang="en-US" dirty="0"/>
-                        <a:t>, </a:t>
-                      </a:r>
-                      <a:r>
-                        <a:rPr lang="en-US" dirty="0" err="1"/>
-                        <a:t>lock_level</a:t>
-                      </a:r>
-                      <a:r>
-                        <a:rPr lang="en-US" dirty="0"/>
-                        <a:t> --&gt; </a:t>
-                      </a:r>
-                      <a:r>
-                        <a:rPr lang="en-US" dirty="0" err="1"/>
-                        <a:t>lock_id</a:t>
-                      </a:r>
-                      <a:r>
-                        <a:rPr lang="en-US" dirty="0"/>
-                        <a:t>,</a:t>
+                        <a:t>/</a:t>
+                      </a:r>
+                      <a:r>
+                        <a:rPr lang="ru-RU" dirty="0"/>
+                        <a:t>переименование файлов,</a:t>
                       </a:r>
                     </a:p>
                     <a:p>
                       <a:pPr marL="285750" indent="-285750">
-                        <a:buFont typeface="Arial" charset="0"/>
+                        <a:buFont typeface="Arial" panose="020B0604020202020204" pitchFamily="34" charset="0"/>
                         <a:buChar char="•"/>
                       </a:pPr>
                       <a:r>
-                        <a:rPr lang="en-US" dirty="0"/>
-                        <a:t>Read: </a:t>
-                      </a:r>
-                      <a:r>
-                        <a:rPr lang="en-US" dirty="0" err="1"/>
-                        <a:t>file_name</a:t>
-                      </a:r>
-                      <a:r>
-                        <a:rPr lang="en-US" dirty="0"/>
-                        <a:t>, </a:t>
-                      </a:r>
-                      <a:r>
-                        <a:rPr lang="en-US" dirty="0" err="1"/>
-                        <a:t>lock_id</a:t>
-                      </a:r>
-                      <a:r>
-                        <a:rPr lang="en-US" dirty="0"/>
-                        <a:t>, offset, size --&gt; data,</a:t>
+                        <a:rPr lang="ru-RU" dirty="0"/>
+                        <a:t>Изменение</a:t>
+                      </a:r>
+                      <a:r>
+                        <a:rPr lang="ru-RU" baseline="0" dirty="0"/>
+                        <a:t> размера файлов,</a:t>
                       </a:r>
                     </a:p>
                     <a:p>
                       <a:pPr marL="285750" indent="-285750">
-                        <a:buFont typeface="Arial" charset="0"/>
+                        <a:buFont typeface="Arial" panose="020B0604020202020204" pitchFamily="34" charset="0"/>
                         <a:buChar char="•"/>
                       </a:pPr>
                       <a:r>
-                        <a:rPr lang="en-US" dirty="0"/>
-                        <a:t>Append: </a:t>
-                      </a:r>
-                      <a:r>
-                        <a:rPr lang="en-US" dirty="0" err="1"/>
-                        <a:t>file_name</a:t>
-                      </a:r>
-                      <a:r>
-                        <a:rPr lang="en-US" dirty="0"/>
-                        <a:t>,</a:t>
-                      </a:r>
-                      <a:r>
-                        <a:rPr lang="en-US" baseline="0" dirty="0"/>
-                        <a:t> </a:t>
-                      </a:r>
-                      <a:r>
-                        <a:rPr lang="en-US" baseline="0" dirty="0" err="1"/>
-                        <a:t>lock_id</a:t>
-                      </a:r>
-                      <a:r>
-                        <a:rPr lang="en-US" baseline="0" dirty="0"/>
-                        <a:t>, data,</a:t>
+                        <a:rPr lang="ru-RU" baseline="0" dirty="0"/>
+                        <a:t>Изменение атрибутов,</a:t>
                       </a:r>
                     </a:p>
                     <a:p>
                       <a:pPr marL="285750" indent="-285750">
-                        <a:buFont typeface="Arial" charset="0"/>
+                        <a:buFont typeface="Arial" panose="020B0604020202020204" pitchFamily="34" charset="0"/>
                         <a:buChar char="•"/>
                       </a:pPr>
                       <a:r>
-                        <a:rPr lang="en-US" baseline="0" dirty="0" err="1"/>
-                        <a:t>PunchHole</a:t>
-                      </a:r>
-                      <a:r>
                         <a:rPr lang="en-US" baseline="0" dirty="0"/>
-                        <a:t>: </a:t>
-                      </a:r>
-                      <a:r>
-                        <a:rPr lang="en-US" baseline="0" dirty="0" err="1"/>
-                        <a:t>file_name</a:t>
-                      </a:r>
-                      <a:r>
-                        <a:rPr lang="en-US" baseline="0" dirty="0"/>
-                        <a:t>, </a:t>
-                      </a:r>
-                      <a:r>
-                        <a:rPr lang="en-US" baseline="0" dirty="0" err="1"/>
-                        <a:t>lock_id</a:t>
-                      </a:r>
-                      <a:r>
-                        <a:rPr lang="en-US" baseline="0" dirty="0"/>
-                        <a:t>, hole,</a:t>
-                      </a:r>
-                    </a:p>
-                    <a:p>
-                      <a:pPr marL="285750" indent="-285750">
-                        <a:buFont typeface="Arial" charset="0"/>
-                        <a:buChar char="•"/>
-                      </a:pPr>
-                      <a:r>
-                        <a:rPr lang="en-US" baseline="0" dirty="0"/>
-                        <a:t>Close: </a:t>
-                      </a:r>
-                      <a:r>
-                        <a:rPr lang="en-US" baseline="0" dirty="0" err="1"/>
-                        <a:t>lock_id</a:t>
-                      </a:r>
-                      <a:r>
-                        <a:rPr lang="en-US" baseline="0" dirty="0"/>
-                        <a:t>,</a:t>
-                      </a:r>
-                    </a:p>
-                    <a:p>
-                      <a:pPr marL="285750" indent="-285750">
-                        <a:buFont typeface="Arial" charset="0"/>
-                        <a:buChar char="•"/>
-                      </a:pPr>
-                      <a:r>
-                        <a:rPr lang="en-US" baseline="0" dirty="0"/>
-                        <a:t>Rename: </a:t>
-                      </a:r>
-                      <a:r>
-                        <a:rPr lang="en-US" baseline="0" dirty="0" err="1"/>
-                        <a:t>file_path_src</a:t>
-                      </a:r>
-                      <a:r>
-                        <a:rPr lang="en-US" baseline="0" dirty="0"/>
-                        <a:t>, </a:t>
-                      </a:r>
-                      <a:r>
-                        <a:rPr lang="en-US" baseline="0" dirty="0" err="1"/>
-                        <a:t>file_path_dst</a:t>
-                      </a:r>
-                      <a:r>
-                        <a:rPr lang="en-US" baseline="0" dirty="0"/>
-                        <a:t>.</a:t>
-                      </a:r>
-                    </a:p>
-                    <a:p>
-                      <a:pPr marL="285750" indent="-285750">
-                        <a:buFont typeface="Arial" charset="0"/>
-                        <a:buChar char="•"/>
-                      </a:pPr>
-                      <a:endParaRPr lang="en-US" baseline="0" dirty="0"/>
-                    </a:p>
-                    <a:p>
-                      <a:pPr marL="0" indent="0">
-                        <a:buFont typeface="Arial" charset="0"/>
-                        <a:buNone/>
-                      </a:pPr>
+                        <a:t>…</a:t>
+                      </a:r>
+                      <a:endParaRPr lang="ru-RU" dirty="0"/>
+                    </a:p>
+                  </a:txBody>
+                  <a:tcPr/>
+                </a:tc>
+                <a:tc>
+                  <a:txBody>
+                    <a:bodyPr/>
+                    <a:lstStyle/>
+                    <a:p>
+                      <a:r>
+                        <a:rPr lang="ru-RU" dirty="0"/>
+                        <a:t>Физические изменения:</a:t>
+                      </a:r>
                       <a:r>
                         <a:rPr lang="ru-RU" baseline="0" dirty="0"/>
-                        <a:t>Возможные значения </a:t>
-                      </a:r>
-                      <a:r>
-                        <a:rPr lang="en-US" baseline="0" dirty="0" err="1"/>
-                        <a:t>lock_id</a:t>
-                      </a:r>
-                      <a:r>
-                        <a:rPr lang="en-US" baseline="0" dirty="0"/>
-                        <a:t>:</a:t>
-                      </a:r>
-                    </a:p>
-                    <a:p>
-                      <a:pPr marL="285750" indent="-285750">
-                        <a:buFont typeface="Arial" charset="0"/>
-                        <a:buChar char="•"/>
-                      </a:pPr>
-                      <a:r>
-                        <a:rPr lang="en-US" baseline="0" dirty="0"/>
-                        <a:t>Shared,</a:t>
-                      </a:r>
-                    </a:p>
-                    <a:p>
-                      <a:pPr marL="285750" indent="-285750">
-                        <a:buFont typeface="Arial" charset="0"/>
-                        <a:buChar char="•"/>
-                      </a:pPr>
-                      <a:r>
-                        <a:rPr lang="en-US" baseline="0" dirty="0"/>
-                        <a:t>Normal (</a:t>
+                        <a:t> с</a:t>
+                      </a:r>
+                      <a:r>
+                        <a:rPr lang="ru-RU" dirty="0"/>
+                        <a:t>одержимое блоков</a:t>
                       </a:r>
                       <a:r>
                         <a:rPr lang="ru-RU" baseline="0" dirty="0"/>
-                        <a:t>может быть только 1, разрешает другие </a:t>
-                      </a:r>
-                      <a:r>
-                        <a:rPr lang="en-US" baseline="0" dirty="0"/>
-                        <a:t>shared</a:t>
-                      </a:r>
-                      <a:r>
-                        <a:rPr lang="ru-RU" baseline="0" dirty="0"/>
-                        <a:t>),</a:t>
-                      </a:r>
-                    </a:p>
-                    <a:p>
-                      <a:pPr marL="285750" indent="-285750">
-                        <a:buFont typeface="Arial" charset="0"/>
-                        <a:buChar char="•"/>
-                      </a:pPr>
-                      <a:r>
-                        <a:rPr lang="en-US" baseline="0" dirty="0"/>
-                        <a:t>Exclusive (</a:t>
-                      </a:r>
-                      <a:r>
-                        <a:rPr lang="ru-RU" baseline="0" dirty="0"/>
-                        <a:t>может быть только 1, запрещает любые другие блокировки).</a:t>
-                      </a:r>
-                      <a:endParaRPr lang="en-US" baseline="0" dirty="0"/>
-                    </a:p>
-                    <a:p>
-                      <a:pPr marL="285750" indent="-285750">
-                        <a:buFont typeface="Arial" charset="0"/>
-                        <a:buChar char="•"/>
-                      </a:pPr>
-                      <a:endParaRPr lang="en-US" baseline="0" dirty="0"/>
-                    </a:p>
-                    <a:p>
-                      <a:pPr marL="0" indent="0">
-                        <a:buFont typeface="Arial" charset="0"/>
-                        <a:buNone/>
-                      </a:pPr>
-                      <a:r>
-                        <a:rPr lang="ru-RU" baseline="0" dirty="0"/>
-                        <a:t>Какие тут есть проблемы? Подсказка: запросы передаются по сети.</a:t>
-                      </a:r>
-                      <a:endParaRPr lang="en-US" baseline="0" dirty="0"/>
+                        <a:t> ФС, которое должно получиться после применения транзакции.</a:t>
+                      </a:r>
+                      <a:endParaRPr lang="ru-RU" dirty="0"/>
                     </a:p>
                   </a:txBody>
                   <a:tcPr/>
@@ -24537,29 +24689,35 @@
                   </a:ext>
                 </a:extLst>
               </a:tr>
-              <a:tr h="370840">
-                <a:tc>
+              <a:tr h="208816">
+                <a:tc gridSpan="2">
                   <a:txBody>
                     <a:bodyPr/>
                     <a:lstStyle/>
                     <a:p>
                       <a:pPr marL="0" indent="0">
-                        <a:buFont typeface="Arial" charset="0"/>
+                        <a:buFont typeface="Arial" panose="020B0604020202020204" pitchFamily="34" charset="0"/>
                         <a:buNone/>
                       </a:pPr>
                       <a:r>
+                        <a:rPr lang="ru-RU" dirty="0"/>
+                        <a:t>Что</a:t>
+                      </a:r>
+                      <a:r>
                         <a:rPr lang="ru-RU" baseline="0" dirty="0"/>
-                        <a:t>Ответ: </a:t>
-                      </a:r>
-                      <a:r>
-                        <a:rPr lang="en-US" baseline="0" dirty="0"/>
-                        <a:t>open, close, rename </a:t>
-                      </a:r>
-                      <a:r>
-                        <a:rPr lang="ru-RU" baseline="0" dirty="0"/>
-                        <a:t>не идемпотентны и требуют, чтобы сетевые соединения никогда не рвались.</a:t>
-                      </a:r>
-                      <a:endParaRPr lang="en-US" baseline="0" dirty="0"/>
+                        <a:t> будет, если во время проигрывания журнала исчезнет питание и надо будет повторить проигрывание журнала?</a:t>
+                      </a:r>
+                      <a:endParaRPr lang="ru-RU" dirty="0"/>
+                    </a:p>
+                  </a:txBody>
+                  <a:tcPr/>
+                </a:tc>
+                <a:tc hMerge="1">
+                  <a:txBody>
+                    <a:bodyPr/>
+                    <a:lstStyle/>
+                    <a:p>
+                      <a:endParaRPr lang="ru-RU" dirty="0"/>
                     </a:p>
                   </a:txBody>
                   <a:tcPr/>
@@ -24567,6 +24725,92 @@
                 <a:extLst>
                   <a:ext uri="{0D108BD9-81ED-4DB2-BD59-A6C34878D82A}">
                     <a16:rowId xmlns:a16="http://schemas.microsoft.com/office/drawing/2014/main" val="10002"/>
+                  </a:ext>
+                </a:extLst>
+              </a:tr>
+              <a:tr h="208816">
+                <a:tc>
+                  <a:txBody>
+                    <a:bodyPr/>
+                    <a:lstStyle/>
+                    <a:p>
+                      <a:pPr marL="0" indent="0">
+                        <a:buFont typeface="Arial" panose="020B0604020202020204" pitchFamily="34" charset="0"/>
+                        <a:buNone/>
+                      </a:pPr>
+                      <a:r>
+                        <a:rPr lang="ru-RU" dirty="0"/>
+                        <a:t>Дважды проиграть</a:t>
+                      </a:r>
+                      <a:r>
+                        <a:rPr lang="ru-RU" baseline="0" dirty="0"/>
+                        <a:t> </a:t>
+                      </a:r>
+                      <a:r>
+                        <a:rPr lang="ru-RU" dirty="0"/>
+                        <a:t>транзакции в общем случае нельзя:</a:t>
+                      </a:r>
+                      <a:br>
+                        <a:rPr lang="ru-RU" dirty="0"/>
+                      </a:br>
+                      <a:r>
+                        <a:rPr lang="ru-RU" dirty="0"/>
+                        <a:t>как повторить </a:t>
+                      </a:r>
+                      <a:r>
+                        <a:rPr lang="en-US" dirty="0"/>
+                        <a:t>rename(“a”, “b”)?</a:t>
+                      </a:r>
+                      <a:endParaRPr lang="ru-RU" dirty="0"/>
+                    </a:p>
+                  </a:txBody>
+                  <a:tcPr/>
+                </a:tc>
+                <a:tc>
+                  <a:txBody>
+                    <a:bodyPr/>
+                    <a:lstStyle/>
+                    <a:p>
+                      <a:pPr marL="0" indent="0">
+                        <a:buFont typeface="Arial" panose="020B0604020202020204" pitchFamily="34" charset="0"/>
+                        <a:buNone/>
+                      </a:pPr>
+                      <a:r>
+                        <a:rPr lang="ru-RU" dirty="0"/>
+                        <a:t>Операции</a:t>
+                      </a:r>
+                      <a:r>
+                        <a:rPr lang="en-US" dirty="0"/>
+                        <a:t> “</a:t>
+                      </a:r>
+                      <a:r>
+                        <a:rPr lang="ru-RU" dirty="0"/>
+                        <a:t>записать такое-то содержимое поверх блока с номером </a:t>
+                      </a:r>
+                      <a:r>
+                        <a:rPr lang="en-US" dirty="0"/>
+                        <a:t>N”</a:t>
+                      </a:r>
+                      <a:r>
+                        <a:rPr lang="ru-RU" baseline="0" dirty="0"/>
+                        <a:t> </a:t>
+                      </a:r>
+                      <a:r>
+                        <a:rPr lang="ru-RU" b="1" baseline="0" dirty="0"/>
+                        <a:t>идемпотентны</a:t>
+                      </a:r>
+                      <a:r>
+                        <a:rPr lang="ru-RU" baseline="0" dirty="0"/>
+                        <a:t>: их можно повторять много раз с тем же эффектом, который даёт однократное повторение.</a:t>
+                      </a:r>
+                      <a:endParaRPr lang="ru-RU" dirty="0"/>
+                    </a:p>
+                  </a:txBody>
+                  <a:tcPr/>
+                </a:tc>
+                <a:extLst>
+                  <a:ext uri="{0D108BD9-81ED-4DB2-BD59-A6C34878D82A}">
+                    <a16:rowId xmlns:a16="http://schemas.microsoft.com/office/drawing/2014/main" val="10003"/>
                   </a:ext>
                 </a:extLst>
               </a:tr>
@@ -24577,7 +24821,7 @@
     </p:spTree>
     <p:extLst>
       <p:ext uri="{BB962C8B-B14F-4D97-AF65-F5344CB8AC3E}">
-        <p14:creationId xmlns:p14="http://schemas.microsoft.com/office/powerpoint/2010/main" val="3988719199"/>
+        <p14:creationId xmlns:p14="http://schemas.microsoft.com/office/powerpoint/2010/main" val="4095414020"/>
       </p:ext>
     </p:extLst>
   </p:cSld>
@@ -24736,6 +24980,559 @@
           <p:nvPr>
             <p:extLst>
               <p:ext uri="{D42A27DB-BD31-4B8C-83A1-F6EECF244321}">
+                <p14:modId xmlns:p14="http://schemas.microsoft.com/office/powerpoint/2010/main" val="1630619957"/>
+              </p:ext>
+            </p:extLst>
+          </p:nvPr>
+        </p:nvGraphicFramePr>
+        <p:xfrm>
+          <a:off x="0" y="365761"/>
+          <a:ext cx="12192000" cy="5034280"/>
+        </p:xfrm>
+        <a:graphic>
+          <a:graphicData uri="http://schemas.openxmlformats.org/drawingml/2006/table">
+            <a:tbl>
+              <a:tblPr firstRow="1" bandRow="1">
+                <a:tableStyleId>{3B4B98B0-60AC-42C2-AFA5-B58CD77FA1E5}</a:tableStyleId>
+              </a:tblPr>
+              <a:tblGrid>
+                <a:gridCol w="12192000">
+                  <a:extLst>
+                    <a:ext uri="{9D8B030D-6E8A-4147-A177-3AD203B41FA5}">
+                      <a16:colId xmlns:a16="http://schemas.microsoft.com/office/drawing/2014/main" val="20000"/>
+                    </a:ext>
+                  </a:extLst>
+                </a:gridCol>
+              </a:tblGrid>
+              <a:tr h="370840">
+                <a:tc>
+                  <a:txBody>
+                    <a:bodyPr/>
+                    <a:lstStyle/>
+                    <a:p>
+                      <a:r>
+                        <a:rPr lang="en-US" sz="2400" dirty="0"/>
+                        <a:t>Case study: </a:t>
+                      </a:r>
+                      <a:r>
+                        <a:rPr lang="ru-RU" sz="2400" dirty="0"/>
+                        <a:t>идемпотентность</a:t>
+                      </a:r>
+                      <a:r>
+                        <a:rPr lang="ru-RU" sz="2400" baseline="0" dirty="0"/>
+                        <a:t> операций</a:t>
+                      </a:r>
+                      <a:endParaRPr lang="en-US" sz="2400" dirty="0"/>
+                    </a:p>
+                  </a:txBody>
+                  <a:tcPr/>
+                </a:tc>
+                <a:extLst>
+                  <a:ext uri="{0D108BD9-81ED-4DB2-BD59-A6C34878D82A}">
+                    <a16:rowId xmlns:a16="http://schemas.microsoft.com/office/drawing/2014/main" val="10000"/>
+                  </a:ext>
+                </a:extLst>
+              </a:tr>
+              <a:tr h="370840">
+                <a:tc>
+                  <a:txBody>
+                    <a:bodyPr/>
+                    <a:lstStyle/>
+                    <a:p>
+                      <a:r>
+                        <a:rPr lang="ru-RU" dirty="0"/>
+                        <a:t>Рассмотрим протокол </a:t>
+                      </a:r>
+                      <a:r>
+                        <a:rPr lang="en-US" dirty="0"/>
+                        <a:t>Acronis </a:t>
+                      </a:r>
+                      <a:r>
+                        <a:rPr lang="ru-RU" dirty="0"/>
+                        <a:t>для общения со </a:t>
+                      </a:r>
+                      <a:r>
+                        <a:rPr lang="ru-RU" dirty="0" err="1"/>
+                        <a:t>стораджем</a:t>
+                      </a:r>
+                      <a:r>
+                        <a:rPr lang="ru-RU" dirty="0"/>
+                        <a:t> для </a:t>
+                      </a:r>
+                      <a:r>
+                        <a:rPr lang="ru-RU" dirty="0" err="1"/>
+                        <a:t>бекапов</a:t>
+                      </a:r>
+                      <a:r>
+                        <a:rPr lang="en-US" dirty="0"/>
+                        <a:t>:</a:t>
+                      </a:r>
+                    </a:p>
+                    <a:p>
+                      <a:endParaRPr lang="en-US" dirty="0"/>
+                    </a:p>
+                    <a:p>
+                      <a:pPr marL="285750" indent="-285750">
+                        <a:buFont typeface="Arial" charset="0"/>
+                        <a:buChar char="•"/>
+                      </a:pPr>
+                      <a:r>
+                        <a:rPr lang="en-US" dirty="0"/>
+                        <a:t>Open: </a:t>
+                      </a:r>
+                      <a:r>
+                        <a:rPr lang="en-US" dirty="0" err="1"/>
+                        <a:t>file_name</a:t>
+                      </a:r>
+                      <a:r>
+                        <a:rPr lang="en-US" dirty="0"/>
+                        <a:t>, </a:t>
+                      </a:r>
+                      <a:r>
+                        <a:rPr lang="en-US" dirty="0" err="1"/>
+                        <a:t>lock_level</a:t>
+                      </a:r>
+                      <a:r>
+                        <a:rPr lang="en-US" dirty="0"/>
+                        <a:t> --&gt; </a:t>
+                      </a:r>
+                      <a:r>
+                        <a:rPr lang="en-US" dirty="0" err="1"/>
+                        <a:t>lock_id</a:t>
+                      </a:r>
+                      <a:r>
+                        <a:rPr lang="en-US" dirty="0"/>
+                        <a:t>,</a:t>
+                      </a:r>
+                    </a:p>
+                    <a:p>
+                      <a:pPr marL="285750" indent="-285750">
+                        <a:buFont typeface="Arial" charset="0"/>
+                        <a:buChar char="•"/>
+                      </a:pPr>
+                      <a:r>
+                        <a:rPr lang="en-US" dirty="0"/>
+                        <a:t>Read: </a:t>
+                      </a:r>
+                      <a:r>
+                        <a:rPr lang="en-US" dirty="0" err="1"/>
+                        <a:t>file_name</a:t>
+                      </a:r>
+                      <a:r>
+                        <a:rPr lang="en-US" dirty="0"/>
+                        <a:t>, </a:t>
+                      </a:r>
+                      <a:r>
+                        <a:rPr lang="en-US" dirty="0" err="1"/>
+                        <a:t>lock_id</a:t>
+                      </a:r>
+                      <a:r>
+                        <a:rPr lang="en-US" dirty="0"/>
+                        <a:t>, offset, size --&gt; data,</a:t>
+                      </a:r>
+                    </a:p>
+                    <a:p>
+                      <a:pPr marL="285750" indent="-285750">
+                        <a:buFont typeface="Arial" charset="0"/>
+                        <a:buChar char="•"/>
+                      </a:pPr>
+                      <a:r>
+                        <a:rPr lang="en-US" dirty="0"/>
+                        <a:t>Append: </a:t>
+                      </a:r>
+                      <a:r>
+                        <a:rPr lang="en-US" dirty="0" err="1"/>
+                        <a:t>file_name</a:t>
+                      </a:r>
+                      <a:r>
+                        <a:rPr lang="en-US" dirty="0"/>
+                        <a:t>,</a:t>
+                      </a:r>
+                      <a:r>
+                        <a:rPr lang="en-US" baseline="0" dirty="0"/>
+                        <a:t> </a:t>
+                      </a:r>
+                      <a:r>
+                        <a:rPr lang="en-US" baseline="0" dirty="0" err="1"/>
+                        <a:t>lock_id</a:t>
+                      </a:r>
+                      <a:r>
+                        <a:rPr lang="en-US" baseline="0" dirty="0"/>
+                        <a:t>, data,</a:t>
+                      </a:r>
+                    </a:p>
+                    <a:p>
+                      <a:pPr marL="285750" indent="-285750">
+                        <a:buFont typeface="Arial" charset="0"/>
+                        <a:buChar char="•"/>
+                      </a:pPr>
+                      <a:r>
+                        <a:rPr lang="en-US" baseline="0" dirty="0" err="1"/>
+                        <a:t>PunchHole</a:t>
+                      </a:r>
+                      <a:r>
+                        <a:rPr lang="en-US" baseline="0" dirty="0"/>
+                        <a:t>: </a:t>
+                      </a:r>
+                      <a:r>
+                        <a:rPr lang="en-US" baseline="0" dirty="0" err="1"/>
+                        <a:t>file_name</a:t>
+                      </a:r>
+                      <a:r>
+                        <a:rPr lang="en-US" baseline="0" dirty="0"/>
+                        <a:t>, </a:t>
+                      </a:r>
+                      <a:r>
+                        <a:rPr lang="en-US" baseline="0" dirty="0" err="1"/>
+                        <a:t>lock_id</a:t>
+                      </a:r>
+                      <a:r>
+                        <a:rPr lang="en-US" baseline="0" dirty="0"/>
+                        <a:t>, hole,</a:t>
+                      </a:r>
+                    </a:p>
+                    <a:p>
+                      <a:pPr marL="285750" indent="-285750">
+                        <a:buFont typeface="Arial" charset="0"/>
+                        <a:buChar char="•"/>
+                      </a:pPr>
+                      <a:r>
+                        <a:rPr lang="en-US" baseline="0" dirty="0"/>
+                        <a:t>Close: </a:t>
+                      </a:r>
+                      <a:r>
+                        <a:rPr lang="en-US" baseline="0" dirty="0" err="1"/>
+                        <a:t>lock_id</a:t>
+                      </a:r>
+                      <a:r>
+                        <a:rPr lang="en-US" baseline="0" dirty="0"/>
+                        <a:t>,</a:t>
+                      </a:r>
+                    </a:p>
+                    <a:p>
+                      <a:pPr marL="285750" indent="-285750">
+                        <a:buFont typeface="Arial" charset="0"/>
+                        <a:buChar char="•"/>
+                      </a:pPr>
+                      <a:r>
+                        <a:rPr lang="en-US" baseline="0" dirty="0"/>
+                        <a:t>Rename: </a:t>
+                      </a:r>
+                      <a:r>
+                        <a:rPr lang="en-US" baseline="0" dirty="0" err="1"/>
+                        <a:t>file_path_src</a:t>
+                      </a:r>
+                      <a:r>
+                        <a:rPr lang="en-US" baseline="0" dirty="0"/>
+                        <a:t>, </a:t>
+                      </a:r>
+                      <a:r>
+                        <a:rPr lang="en-US" baseline="0" dirty="0" err="1"/>
+                        <a:t>file_path_dst</a:t>
+                      </a:r>
+                      <a:r>
+                        <a:rPr lang="en-US" baseline="0" dirty="0"/>
+                        <a:t>.</a:t>
+                      </a:r>
+                    </a:p>
+                    <a:p>
+                      <a:pPr marL="285750" indent="-285750">
+                        <a:buFont typeface="Arial" charset="0"/>
+                        <a:buChar char="•"/>
+                      </a:pPr>
+                      <a:endParaRPr lang="en-US" baseline="0" dirty="0"/>
+                    </a:p>
+                    <a:p>
+                      <a:pPr marL="0" indent="0">
+                        <a:buFont typeface="Arial" charset="0"/>
+                        <a:buNone/>
+                      </a:pPr>
+                      <a:r>
+                        <a:rPr lang="ru-RU" baseline="0" dirty="0"/>
+                        <a:t>Возможные значения </a:t>
+                      </a:r>
+                      <a:r>
+                        <a:rPr lang="en-US" baseline="0" dirty="0" err="1"/>
+                        <a:t>lock_id</a:t>
+                      </a:r>
+                      <a:r>
+                        <a:rPr lang="en-US" baseline="0" dirty="0"/>
+                        <a:t>:</a:t>
+                      </a:r>
+                    </a:p>
+                    <a:p>
+                      <a:pPr marL="285750" indent="-285750">
+                        <a:buFont typeface="Arial" charset="0"/>
+                        <a:buChar char="•"/>
+                      </a:pPr>
+                      <a:r>
+                        <a:rPr lang="en-US" baseline="0" dirty="0"/>
+                        <a:t>Shared,</a:t>
+                      </a:r>
+                    </a:p>
+                    <a:p>
+                      <a:pPr marL="285750" indent="-285750">
+                        <a:buFont typeface="Arial" charset="0"/>
+                        <a:buChar char="•"/>
+                      </a:pPr>
+                      <a:r>
+                        <a:rPr lang="en-US" baseline="0" dirty="0"/>
+                        <a:t>Normal (</a:t>
+                      </a:r>
+                      <a:r>
+                        <a:rPr lang="ru-RU" baseline="0" dirty="0"/>
+                        <a:t>может быть только 1, разрешает другие </a:t>
+                      </a:r>
+                      <a:r>
+                        <a:rPr lang="en-US" baseline="0" dirty="0"/>
+                        <a:t>shared</a:t>
+                      </a:r>
+                      <a:r>
+                        <a:rPr lang="ru-RU" baseline="0" dirty="0"/>
+                        <a:t>),</a:t>
+                      </a:r>
+                    </a:p>
+                    <a:p>
+                      <a:pPr marL="285750" indent="-285750">
+                        <a:buFont typeface="Arial" charset="0"/>
+                        <a:buChar char="•"/>
+                      </a:pPr>
+                      <a:r>
+                        <a:rPr lang="en-US" baseline="0" dirty="0"/>
+                        <a:t>Exclusive (</a:t>
+                      </a:r>
+                      <a:r>
+                        <a:rPr lang="ru-RU" baseline="0" dirty="0"/>
+                        <a:t>может быть только 1, запрещает любые другие блокировки).</a:t>
+                      </a:r>
+                      <a:endParaRPr lang="en-US" baseline="0" dirty="0"/>
+                    </a:p>
+                    <a:p>
+                      <a:pPr marL="285750" indent="-285750">
+                        <a:buFont typeface="Arial" charset="0"/>
+                        <a:buChar char="•"/>
+                      </a:pPr>
+                      <a:endParaRPr lang="en-US" baseline="0" dirty="0"/>
+                    </a:p>
+                    <a:p>
+                      <a:pPr marL="0" indent="0">
+                        <a:buFont typeface="Arial" charset="0"/>
+                        <a:buNone/>
+                      </a:pPr>
+                      <a:r>
+                        <a:rPr lang="ru-RU" baseline="0" dirty="0"/>
+                        <a:t>Какие тут есть проблемы? Подсказка: запросы передаются по сети.</a:t>
+                      </a:r>
+                      <a:endParaRPr lang="en-US" baseline="0" dirty="0"/>
+                    </a:p>
+                  </a:txBody>
+                  <a:tcPr/>
+                </a:tc>
+                <a:extLst>
+                  <a:ext uri="{0D108BD9-81ED-4DB2-BD59-A6C34878D82A}">
+                    <a16:rowId xmlns:a16="http://schemas.microsoft.com/office/drawing/2014/main" val="10001"/>
+                  </a:ext>
+                </a:extLst>
+              </a:tr>
+              <a:tr h="370840">
+                <a:tc>
+                  <a:txBody>
+                    <a:bodyPr/>
+                    <a:lstStyle/>
+                    <a:p>
+                      <a:pPr marL="0" indent="0">
+                        <a:buFont typeface="Arial" charset="0"/>
+                        <a:buNone/>
+                      </a:pPr>
+                      <a:r>
+                        <a:rPr lang="ru-RU" baseline="0" dirty="0"/>
+                        <a:t>Ответ: </a:t>
+                      </a:r>
+                      <a:r>
+                        <a:rPr lang="en-US" baseline="0" dirty="0"/>
+                        <a:t>open, close, rename </a:t>
+                      </a:r>
+                      <a:r>
+                        <a:rPr lang="ru-RU" baseline="0" dirty="0"/>
+                        <a:t>не идемпотентны и требуют, чтобы сетевые соединения никогда не рвались.</a:t>
+                      </a:r>
+                      <a:endParaRPr lang="en-US" baseline="0" dirty="0"/>
+                    </a:p>
+                  </a:txBody>
+                  <a:tcPr/>
+                </a:tc>
+                <a:extLst>
+                  <a:ext uri="{0D108BD9-81ED-4DB2-BD59-A6C34878D82A}">
+                    <a16:rowId xmlns:a16="http://schemas.microsoft.com/office/drawing/2014/main" val="10002"/>
+                  </a:ext>
+                </a:extLst>
+              </a:tr>
+            </a:tbl>
+          </a:graphicData>
+        </a:graphic>
+      </p:graphicFrame>
+    </p:spTree>
+    <p:extLst>
+      <p:ext uri="{BB962C8B-B14F-4D97-AF65-F5344CB8AC3E}">
+        <p14:creationId xmlns:p14="http://schemas.microsoft.com/office/powerpoint/2010/main" val="3988719199"/>
+      </p:ext>
+    </p:extLst>
+  </p:cSld>
+  <p:clrMapOvr>
+    <a:masterClrMapping/>
+  </p:clrMapOvr>
+</p:sld>
+</file>
+
+<file path=ppt/slides/slide35.xml><?xml version="1.0" encoding="utf-8"?>
+<p:sld xmlns:a="http://schemas.openxmlformats.org/drawingml/2006/main" xmlns:r="http://schemas.openxmlformats.org/officeDocument/2006/relationships" xmlns:p="http://schemas.openxmlformats.org/presentationml/2006/main">
+  <p:cSld>
+    <p:spTree>
+      <p:nvGrpSpPr>
+        <p:cNvPr id="1" name=""/>
+        <p:cNvGrpSpPr/>
+        <p:nvPr/>
+      </p:nvGrpSpPr>
+      <p:grpSpPr>
+        <a:xfrm>
+          <a:off x="0" y="0"/>
+          <a:ext cx="0" cy="0"/>
+          <a:chOff x="0" y="0"/>
+          <a:chExt cx="0" cy="0"/>
+        </a:xfrm>
+      </p:grpSpPr>
+      <p:graphicFrame>
+        <p:nvGraphicFramePr>
+          <p:cNvPr id="5" name="Table 4"/>
+          <p:cNvGraphicFramePr>
+            <a:graphicFrameLocks noGrp="1"/>
+          </p:cNvGraphicFramePr>
+          <p:nvPr>
+            <p:extLst>
+              <p:ext uri="{D42A27DB-BD31-4B8C-83A1-F6EECF244321}">
+                <p14:modId xmlns:p14="http://schemas.microsoft.com/office/powerpoint/2010/main" val="2281224332"/>
+              </p:ext>
+            </p:extLst>
+          </p:nvPr>
+        </p:nvGraphicFramePr>
+        <p:xfrm>
+          <a:off x="0" y="1"/>
+          <a:ext cx="12192000" cy="365760"/>
+        </p:xfrm>
+        <a:graphic>
+          <a:graphicData uri="http://schemas.openxmlformats.org/drawingml/2006/table">
+            <a:tbl>
+              <a:tblPr firstRow="1" bandRow="1">
+                <a:tableStyleId>{5C22544A-7EE6-4342-B048-85BDC9FD1C3A}</a:tableStyleId>
+              </a:tblPr>
+              <a:tblGrid>
+                <a:gridCol w="12192000">
+                  <a:extLst>
+                    <a:ext uri="{9D8B030D-6E8A-4147-A177-3AD203B41FA5}">
+                      <a16:colId xmlns:a16="http://schemas.microsoft.com/office/drawing/2014/main" val="20000"/>
+                    </a:ext>
+                  </a:extLst>
+                </a:gridCol>
+              </a:tblGrid>
+              <a:tr h="321276">
+                <a:tc>
+                  <a:txBody>
+                    <a:bodyPr/>
+                    <a:lstStyle/>
+                    <a:p>
+                      <a:r>
+                        <a:rPr lang="ru-RU" dirty="0"/>
+                        <a:t>Основы</a:t>
+                      </a:r>
+                      <a:r>
+                        <a:rPr lang="ru-RU" baseline="0" dirty="0"/>
+                        <a:t> построения файловых систем</a:t>
+                      </a:r>
+                      <a:endParaRPr lang="ru-RU" dirty="0"/>
+                    </a:p>
+                  </a:txBody>
+                  <a:tcPr/>
+                </a:tc>
+                <a:extLst>
+                  <a:ext uri="{0D108BD9-81ED-4DB2-BD59-A6C34878D82A}">
+                    <a16:rowId xmlns:a16="http://schemas.microsoft.com/office/drawing/2014/main" val="10000"/>
+                  </a:ext>
+                </a:extLst>
+              </a:tr>
+            </a:tbl>
+          </a:graphicData>
+        </a:graphic>
+      </p:graphicFrame>
+      <p:graphicFrame>
+        <p:nvGraphicFramePr>
+          <p:cNvPr id="6" name="Table 5"/>
+          <p:cNvGraphicFramePr>
+            <a:graphicFrameLocks noGrp="1"/>
+          </p:cNvGraphicFramePr>
+          <p:nvPr>
+            <p:extLst>
+              <p:ext uri="{D42A27DB-BD31-4B8C-83A1-F6EECF244321}">
+                <p14:modId xmlns:p14="http://schemas.microsoft.com/office/powerpoint/2010/main" val="4164474727"/>
+              </p:ext>
+            </p:extLst>
+          </p:nvPr>
+        </p:nvGraphicFramePr>
+        <p:xfrm>
+          <a:off x="0" y="6532604"/>
+          <a:ext cx="12192000" cy="365760"/>
+        </p:xfrm>
+        <a:graphic>
+          <a:graphicData uri="http://schemas.openxmlformats.org/drawingml/2006/table">
+            <a:tbl>
+              <a:tblPr firstRow="1" bandRow="1">
+                <a:tableStyleId>{5C22544A-7EE6-4342-B048-85BDC9FD1C3A}</a:tableStyleId>
+              </a:tblPr>
+              <a:tblGrid>
+                <a:gridCol w="12192000">
+                  <a:extLst>
+                    <a:ext uri="{9D8B030D-6E8A-4147-A177-3AD203B41FA5}">
+                      <a16:colId xmlns:a16="http://schemas.microsoft.com/office/drawing/2014/main" val="20000"/>
+                    </a:ext>
+                  </a:extLst>
+                </a:gridCol>
+              </a:tblGrid>
+              <a:tr h="308094">
+                <a:tc>
+                  <a:txBody>
+                    <a:bodyPr/>
+                    <a:lstStyle/>
+                    <a:p>
+                      <a:r>
+                        <a:rPr lang="en-US" dirty="0"/>
+                        <a:t>Acronis @ </a:t>
+                      </a:r>
+                      <a:r>
+                        <a:rPr lang="ru-RU" dirty="0"/>
+                        <a:t>МФТИ</a:t>
+                      </a:r>
+                    </a:p>
+                  </a:txBody>
+                  <a:tcPr/>
+                </a:tc>
+                <a:extLst>
+                  <a:ext uri="{0D108BD9-81ED-4DB2-BD59-A6C34878D82A}">
+                    <a16:rowId xmlns:a16="http://schemas.microsoft.com/office/drawing/2014/main" val="10000"/>
+                  </a:ext>
+                </a:extLst>
+              </a:tr>
+            </a:tbl>
+          </a:graphicData>
+        </a:graphic>
+      </p:graphicFrame>
+      <p:graphicFrame>
+        <p:nvGraphicFramePr>
+          <p:cNvPr id="2" name="Table 1"/>
+          <p:cNvGraphicFramePr>
+            <a:graphicFrameLocks noGrp="1"/>
+          </p:cNvGraphicFramePr>
+          <p:nvPr>
+            <p:extLst>
+              <p:ext uri="{D42A27DB-BD31-4B8C-83A1-F6EECF244321}">
                 <p14:modId xmlns:p14="http://schemas.microsoft.com/office/powerpoint/2010/main" val="693015308"/>
               </p:ext>
             </p:extLst>
@@ -24822,7 +25619,7 @@
 </p:sld>
 </file>
 
-<file path=ppt/slides/slide35.xml><?xml version="1.0" encoding="utf-8"?>
+<file path=ppt/slides/slide36.xml><?xml version="1.0" encoding="utf-8"?>
 <p:sld xmlns:a="http://schemas.openxmlformats.org/drawingml/2006/main" xmlns:r="http://schemas.openxmlformats.org/officeDocument/2006/relationships" xmlns:p="http://schemas.openxmlformats.org/presentationml/2006/main">
   <p:cSld>
     <p:spTree>
@@ -25441,7 +26238,7 @@
 </p:sld>
 </file>
 
-<file path=ppt/slides/slide36.xml><?xml version="1.0" encoding="utf-8"?>
+<file path=ppt/slides/slide37.xml><?xml version="1.0" encoding="utf-8"?>
 <p:sld xmlns:a="http://schemas.openxmlformats.org/drawingml/2006/main" xmlns:r="http://schemas.openxmlformats.org/officeDocument/2006/relationships" xmlns:p="http://schemas.openxmlformats.org/presentationml/2006/main">
   <p:cSld>
     <p:spTree>
@@ -25590,7 +26387,7 @@
           <p:nvPr>
             <p:extLst>
               <p:ext uri="{D42A27DB-BD31-4B8C-83A1-F6EECF244321}">
-                <p14:modId xmlns:p14="http://schemas.microsoft.com/office/powerpoint/2010/main" val="1577954084"/>
+                <p14:modId xmlns:p14="http://schemas.microsoft.com/office/powerpoint/2010/main" val="2786585114"/>
               </p:ext>
             </p:extLst>
           </p:nvPr>
@@ -25830,16 +26627,16 @@
                         <a:t>Запись сектора </a:t>
                       </a:r>
                       <a:r>
-                        <a:rPr lang="ru-RU" dirty="0" err="1"/>
+                        <a:rPr lang="ru-RU" dirty="0" err="1" smtClean="0"/>
                         <a:t>атомарна</a:t>
                       </a:r>
                       <a:r>
-                        <a:rPr lang="en-US" dirty="0"/>
-                        <a:t>**</a:t>
+                        <a:rPr lang="ru-RU" dirty="0" smtClean="0"/>
+                        <a:t>, </a:t>
                       </a:r>
                       <a:r>
                         <a:rPr lang="ru-RU" dirty="0"/>
-                        <a:t>, поэтому место обрыва журнала</a:t>
+                        <a:t>поэтому место обрыва журнала</a:t>
                       </a:r>
                       <a:r>
                         <a:rPr lang="ru-RU" baseline="0" dirty="0"/>
@@ -25875,13 +26672,6 @@
                         <a:t>секторы, изменённые в транзакции.</a:t>
                       </a:r>
                       <a:endParaRPr lang="en-US" baseline="0" dirty="0"/>
-                    </a:p>
-                    <a:p>
-                      <a:pPr marL="0" indent="0">
-                        <a:buFont typeface="Arial" panose="020B0604020202020204" pitchFamily="34" charset="0"/>
-                        <a:buNone/>
-                      </a:pPr>
-                      <a:endParaRPr lang="en-US" baseline="0"/>
                     </a:p>
                     <a:p>
                       <a:pPr marL="0" indent="0">
@@ -25889,49 +26679,6 @@
                         <a:buNone/>
                       </a:pPr>
                       <a:endParaRPr lang="en-US" baseline="0" dirty="0"/>
-                    </a:p>
-                    <a:p>
-                      <a:pPr marL="0" indent="0">
-                        <a:buFont typeface="Arial" panose="020B0604020202020204" pitchFamily="34" charset="0"/>
-                        <a:buNone/>
-                      </a:pPr>
-                      <a:r>
-                        <a:rPr lang="en-US" sz="1500" i="1" baseline="0" dirty="0">
-                          <a:solidFill>
-                            <a:schemeClr val="bg1">
-                              <a:lumMod val="65000"/>
-                            </a:schemeClr>
-                          </a:solidFill>
-                        </a:rPr>
-                        <a:t>** https://</a:t>
-                      </a:r>
-                      <a:r>
-                        <a:rPr lang="en-US" sz="1500" i="1" baseline="0" dirty="0" err="1">
-                          <a:solidFill>
-                            <a:schemeClr val="bg1">
-                              <a:lumMod val="65000"/>
-                            </a:schemeClr>
-                          </a:solidFill>
-                        </a:rPr>
-                        <a:t>plus.google.com</a:t>
-                      </a:r>
-                      <a:r>
-                        <a:rPr lang="en-US" sz="1500" i="1" baseline="0" dirty="0">
-                          <a:solidFill>
-                            <a:schemeClr val="bg1">
-                              <a:lumMod val="65000"/>
-                            </a:schemeClr>
-                          </a:solidFill>
-                        </a:rPr>
-                        <a:t>/101761226576930717211/posts/Pctq7kk1dLL</a:t>
-                      </a:r>
-                      <a:endParaRPr lang="ru-RU" sz="1500" i="1" dirty="0">
-                        <a:solidFill>
-                          <a:schemeClr val="bg1">
-                            <a:lumMod val="65000"/>
-                          </a:schemeClr>
-                        </a:solidFill>
-                      </a:endParaRPr>
                     </a:p>
                   </a:txBody>
                   <a:tcPr/>
@@ -27338,7 +28085,7 @@
           <p:nvPr>
             <p:extLst>
               <p:ext uri="{D42A27DB-BD31-4B8C-83A1-F6EECF244321}">
-                <p14:modId xmlns:p14="http://schemas.microsoft.com/office/powerpoint/2010/main" val="1340382488"/>
+                <p14:modId xmlns:p14="http://schemas.microsoft.com/office/powerpoint/2010/main" val="164394303"/>
               </p:ext>
             </p:extLst>
           </p:nvPr>
@@ -27453,31 +28200,37 @@
                     </a:p>
                   </a:txBody>
                   <a:tcPr>
+                    <a:noFill/>
+                  </a:tcPr>
+                </a:tc>
+                <a:tc>
+                  <a:txBody>
+                    <a:bodyPr/>
+                    <a:lstStyle/>
+                    <a:p>
+                      <a:r>
+                        <a:rPr lang="en-US" dirty="0" err="1"/>
+                        <a:t>Inode</a:t>
+                      </a:r>
+                      <a:r>
+                        <a:rPr lang="en-US" dirty="0"/>
+                        <a:t/>
+                      </a:r>
+                      <a:br>
+                        <a:rPr lang="en-US" dirty="0"/>
+                      </a:br>
+                      <a:r>
+                        <a:rPr lang="en-US" dirty="0"/>
+                        <a:t>bitmap</a:t>
+                      </a:r>
+                      <a:endParaRPr lang="ru-RU" dirty="0"/>
+                    </a:p>
+                  </a:txBody>
+                  <a:tcPr>
                     <a:solidFill>
                       <a:srgbClr val="00B050"/>
                     </a:solidFill>
                   </a:tcPr>
-                </a:tc>
-                <a:tc>
-                  <a:txBody>
-                    <a:bodyPr/>
-                    <a:lstStyle/>
-                    <a:p>
-                      <a:r>
-                        <a:rPr lang="en-US" dirty="0" err="1"/>
-                        <a:t>Inode</a:t>
-                      </a:r>
-                      <a:br>
-                        <a:rPr lang="en-US" dirty="0"/>
-                      </a:br>
-                      <a:r>
-                        <a:rPr lang="en-US" dirty="0"/>
-                        <a:t>bitmap</a:t>
-                      </a:r>
-                      <a:endParaRPr lang="ru-RU" dirty="0"/>
-                    </a:p>
-                  </a:txBody>
-                  <a:tcPr/>
                 </a:tc>
                 <a:tc>
                   <a:txBody>
@@ -28228,7 +28981,7 @@
           <p:nvPr>
             <p:extLst>
               <p:ext uri="{D42A27DB-BD31-4B8C-83A1-F6EECF244321}">
-                <p14:modId xmlns:p14="http://schemas.microsoft.com/office/powerpoint/2010/main" val="2771803520"/>
+                <p14:modId xmlns:p14="http://schemas.microsoft.com/office/powerpoint/2010/main" val="1277016050"/>
               </p:ext>
             </p:extLst>
           </p:nvPr>
@@ -28342,31 +29095,37 @@
                       <a:endParaRPr lang="ru-RU" dirty="0"/>
                     </a:p>
                   </a:txBody>
-                  <a:tcPr/>
-                </a:tc>
-                <a:tc>
-                  <a:txBody>
-                    <a:bodyPr/>
-                    <a:lstStyle/>
-                    <a:p>
-                      <a:r>
-                        <a:rPr lang="en-US" dirty="0" err="1"/>
-                        <a:t>Inode</a:t>
-                      </a:r>
-                      <a:br>
-                        <a:rPr lang="en-US" dirty="0"/>
-                      </a:br>
-                      <a:r>
-                        <a:rPr lang="en-US" dirty="0"/>
-                        <a:t>bitmap</a:t>
-                      </a:r>
-                      <a:endParaRPr lang="ru-RU" dirty="0"/>
-                    </a:p>
-                  </a:txBody>
                   <a:tcPr>
                     <a:solidFill>
                       <a:srgbClr val="00B050"/>
                     </a:solidFill>
+                  </a:tcPr>
+                </a:tc>
+                <a:tc>
+                  <a:txBody>
+                    <a:bodyPr/>
+                    <a:lstStyle/>
+                    <a:p>
+                      <a:r>
+                        <a:rPr lang="en-US" dirty="0" err="1"/>
+                        <a:t>Inode</a:t>
+                      </a:r>
+                      <a:r>
+                        <a:rPr lang="en-US" dirty="0"/>
+                        <a:t/>
+                      </a:r>
+                      <a:br>
+                        <a:rPr lang="en-US" dirty="0"/>
+                      </a:br>
+                      <a:r>
+                        <a:rPr lang="en-US" dirty="0"/>
+                        <a:t>bitmap</a:t>
+                      </a:r>
+                      <a:endParaRPr lang="ru-RU" dirty="0"/>
+                    </a:p>
+                  </a:txBody>
+                  <a:tcPr>
+                    <a:noFill/>
                   </a:tcPr>
                 </a:tc>
                 <a:tc>
@@ -29130,7 +29889,7 @@
           <p:nvPr>
             <p:extLst>
               <p:ext uri="{D42A27DB-BD31-4B8C-83A1-F6EECF244321}">
-                <p14:modId xmlns:p14="http://schemas.microsoft.com/office/powerpoint/2010/main" val="1416251305"/>
+                <p14:modId xmlns:p14="http://schemas.microsoft.com/office/powerpoint/2010/main" val="3702936049"/>
               </p:ext>
             </p:extLst>
           </p:nvPr>
@@ -29202,27 +29961,6 @@
                       <a:endParaRPr lang="ru-RU" dirty="0"/>
                     </a:p>
                   </a:txBody>
-                  <a:tcPr/>
-                </a:tc>
-                <a:tc>
-                  <a:txBody>
-                    <a:bodyPr/>
-                    <a:lstStyle/>
-                    <a:p>
-                      <a:r>
-                        <a:rPr lang="en-US" dirty="0"/>
-                        <a:t>Block group</a:t>
-                      </a:r>
-                      <a:br>
-                        <a:rPr lang="en-US" dirty="0"/>
-                      </a:br>
-                      <a:r>
-                        <a:rPr lang="en-US" dirty="0"/>
-                        <a:t>header</a:t>
-                      </a:r>
-                      <a:endParaRPr lang="ru-RU" dirty="0"/>
-                    </a:p>
-                  </a:txBody>
                   <a:tcPr>
                     <a:solidFill>
                       <a:srgbClr val="FF0000"/>
@@ -29236,14 +29974,14 @@
                     <a:p>
                       <a:r>
                         <a:rPr lang="en-US" dirty="0"/>
-                        <a:t>Block</a:t>
+                        <a:t>Block group</a:t>
                       </a:r>
                       <a:br>
                         <a:rPr lang="en-US" dirty="0"/>
                       </a:br>
                       <a:r>
                         <a:rPr lang="en-US" dirty="0"/>
-                        <a:t>bitmap</a:t>
+                        <a:t>header</a:t>
                       </a:r>
                       <a:endParaRPr lang="ru-RU" dirty="0"/>
                     </a:p>
@@ -29260,8 +29998,37 @@
                     <a:lstStyle/>
                     <a:p>
                       <a:r>
+                        <a:rPr lang="en-US" dirty="0"/>
+                        <a:t>Block</a:t>
+                      </a:r>
+                      <a:br>
+                        <a:rPr lang="en-US" dirty="0"/>
+                      </a:br>
+                      <a:r>
+                        <a:rPr lang="en-US" dirty="0"/>
+                        <a:t>bitmap</a:t>
+                      </a:r>
+                      <a:endParaRPr lang="ru-RU" dirty="0"/>
+                    </a:p>
+                  </a:txBody>
+                  <a:tcPr>
+                    <a:solidFill>
+                      <a:srgbClr val="FF0000"/>
+                    </a:solidFill>
+                  </a:tcPr>
+                </a:tc>
+                <a:tc>
+                  <a:txBody>
+                    <a:bodyPr/>
+                    <a:lstStyle/>
+                    <a:p>
+                      <a:r>
                         <a:rPr lang="en-US" dirty="0" err="1"/>
                         <a:t>Inode</a:t>
+                      </a:r>
+                      <a:r>
+                        <a:rPr lang="en-US" dirty="0"/>
+                        <a:t/>
                       </a:r>
                       <a:br>
                         <a:rPr lang="en-US" dirty="0"/>
@@ -30165,6 +30932,10 @@
                         <a:rPr lang="en-US" dirty="0" err="1"/>
                         <a:t>Inode</a:t>
                       </a:r>
+                      <a:r>
+                        <a:rPr lang="en-US" dirty="0"/>
+                        <a:t/>
+                      </a:r>
                       <a:br>
                         <a:rPr lang="en-US" dirty="0"/>
                       </a:br>
@@ -31062,6 +31833,10 @@
                       <a:r>
                         <a:rPr lang="en-US" dirty="0" err="1"/>
                         <a:t>Inode</a:t>
+                      </a:r>
+                      <a:r>
+                        <a:rPr lang="en-US" dirty="0"/>
+                        <a:t/>
                       </a:r>
                       <a:br>
                         <a:rPr lang="en-US" dirty="0"/>

</xml_diff>